<commit_message>
editing README.md and powerPoint with index.js
</commit_message>
<xml_diff>
--- a/PowerPoint/React.pptx
+++ b/PowerPoint/React.pptx
@@ -298,7 +298,7 @@
           <a:p>
             <a:fld id="{4A105A33-B027-4A7D-BC88-BF07D2F361B2}" type="datetimeFigureOut">
               <a:rPr lang="en-US" smtClean="0"/>
-              <a:t>9/11/2018</a:t>
+              <a:t>9/12/2018</a:t>
             </a:fld>
             <a:endParaRPr lang="en-US"/>
           </a:p>
@@ -496,7 +496,7 @@
           <a:p>
             <a:fld id="{4A105A33-B027-4A7D-BC88-BF07D2F361B2}" type="datetimeFigureOut">
               <a:rPr lang="en-US" smtClean="0"/>
-              <a:t>9/11/2018</a:t>
+              <a:t>9/12/2018</a:t>
             </a:fld>
             <a:endParaRPr lang="en-US"/>
           </a:p>
@@ -704,7 +704,7 @@
           <a:p>
             <a:fld id="{4A105A33-B027-4A7D-BC88-BF07D2F361B2}" type="datetimeFigureOut">
               <a:rPr lang="en-US" smtClean="0"/>
-              <a:t>9/11/2018</a:t>
+              <a:t>9/12/2018</a:t>
             </a:fld>
             <a:endParaRPr lang="en-US"/>
           </a:p>
@@ -902,7 +902,7 @@
           <a:p>
             <a:fld id="{4A105A33-B027-4A7D-BC88-BF07D2F361B2}" type="datetimeFigureOut">
               <a:rPr lang="en-US" smtClean="0"/>
-              <a:t>9/11/2018</a:t>
+              <a:t>9/12/2018</a:t>
             </a:fld>
             <a:endParaRPr lang="en-US"/>
           </a:p>
@@ -1177,7 +1177,7 @@
           <a:p>
             <a:fld id="{4A105A33-B027-4A7D-BC88-BF07D2F361B2}" type="datetimeFigureOut">
               <a:rPr lang="en-US" smtClean="0"/>
-              <a:t>9/11/2018</a:t>
+              <a:t>9/12/2018</a:t>
             </a:fld>
             <a:endParaRPr lang="en-US"/>
           </a:p>
@@ -1442,7 +1442,7 @@
           <a:p>
             <a:fld id="{4A105A33-B027-4A7D-BC88-BF07D2F361B2}" type="datetimeFigureOut">
               <a:rPr lang="en-US" smtClean="0"/>
-              <a:t>9/11/2018</a:t>
+              <a:t>9/12/2018</a:t>
             </a:fld>
             <a:endParaRPr lang="en-US"/>
           </a:p>
@@ -1854,7 +1854,7 @@
           <a:p>
             <a:fld id="{4A105A33-B027-4A7D-BC88-BF07D2F361B2}" type="datetimeFigureOut">
               <a:rPr lang="en-US" smtClean="0"/>
-              <a:t>9/11/2018</a:t>
+              <a:t>9/12/2018</a:t>
             </a:fld>
             <a:endParaRPr lang="en-US"/>
           </a:p>
@@ -1995,7 +1995,7 @@
           <a:p>
             <a:fld id="{4A105A33-B027-4A7D-BC88-BF07D2F361B2}" type="datetimeFigureOut">
               <a:rPr lang="en-US" smtClean="0"/>
-              <a:t>9/11/2018</a:t>
+              <a:t>9/12/2018</a:t>
             </a:fld>
             <a:endParaRPr lang="en-US"/>
           </a:p>
@@ -2108,7 +2108,7 @@
           <a:p>
             <a:fld id="{4A105A33-B027-4A7D-BC88-BF07D2F361B2}" type="datetimeFigureOut">
               <a:rPr lang="en-US" smtClean="0"/>
-              <a:t>9/11/2018</a:t>
+              <a:t>9/12/2018</a:t>
             </a:fld>
             <a:endParaRPr lang="en-US"/>
           </a:p>
@@ -2419,7 +2419,7 @@
           <a:p>
             <a:fld id="{4A105A33-B027-4A7D-BC88-BF07D2F361B2}" type="datetimeFigureOut">
               <a:rPr lang="en-US" smtClean="0"/>
-              <a:t>9/11/2018</a:t>
+              <a:t>9/12/2018</a:t>
             </a:fld>
             <a:endParaRPr lang="en-US"/>
           </a:p>
@@ -2707,7 +2707,7 @@
           <a:p>
             <a:fld id="{4A105A33-B027-4A7D-BC88-BF07D2F361B2}" type="datetimeFigureOut">
               <a:rPr lang="en-US" smtClean="0"/>
-              <a:t>9/11/2018</a:t>
+              <a:t>9/12/2018</a:t>
             </a:fld>
             <a:endParaRPr lang="en-US"/>
           </a:p>
@@ -2948,7 +2948,7 @@
           <a:p>
             <a:fld id="{4A105A33-B027-4A7D-BC88-BF07D2F361B2}" type="datetimeFigureOut">
               <a:rPr lang="en-US" smtClean="0"/>
-              <a:t>9/11/2018</a:t>
+              <a:t>9/12/2018</a:t>
             </a:fld>
             <a:endParaRPr lang="en-US"/>
           </a:p>
@@ -3682,6 +3682,15 @@
               <a:t>Passes data to other components as props.</a:t>
             </a:r>
           </a:p>
+          <a:p>
+            <a:r>
+              <a:rPr lang="en-US" dirty="0"/>
+              <a:t>Uses the virtual DOM.</a:t>
+            </a:r>
+          </a:p>
+          <a:p>
+            <a:endParaRPr lang="en-US" dirty="0"/>
+          </a:p>
         </p:txBody>
       </p:sp>
       <p:sp>
@@ -3744,6 +3753,21 @@
               <a:rPr lang="en-US" dirty="0"/>
               <a:t>Notifies changes through callbacks to the parent component.</a:t>
             </a:r>
+          </a:p>
+          <a:p>
+            <a:r>
+              <a:rPr lang="en-US" dirty="0"/>
+              <a:t>Uses the DOM.</a:t>
+            </a:r>
+          </a:p>
+          <a:p>
+            <a:r>
+              <a:rPr lang="en-US" dirty="0"/>
+              <a:t>Binds to DOM elements using the Ref keyword.</a:t>
+            </a:r>
+          </a:p>
+          <a:p>
+            <a:endParaRPr lang="en-US" dirty="0"/>
           </a:p>
         </p:txBody>
       </p:sp>
@@ -5820,87 +5844,6 @@
           </a:prstGeom>
         </p:spPr>
       </p:pic>
-      <p:sp>
-        <p:nvSpPr>
-          <p:cNvPr id="6" name="TextBox 5">
-            <a:extLst>
-              <a:ext uri="{FF2B5EF4-FFF2-40B4-BE49-F238E27FC236}">
-                <a16:creationId xmlns:a16="http://schemas.microsoft.com/office/drawing/2014/main" id="{6C60CB28-F552-4535-82E4-16C5C9F107E0}"/>
-              </a:ext>
-            </a:extLst>
-          </p:cNvPr>
-          <p:cNvSpPr txBox="1"/>
-          <p:nvPr/>
-        </p:nvSpPr>
-        <p:spPr>
-          <a:xfrm>
-            <a:off x="9267276" y="5076100"/>
-            <a:ext cx="2440091" cy="200055"/>
-          </a:xfrm>
-          <a:prstGeom prst="rect">
-            <a:avLst/>
-          </a:prstGeom>
-          <a:solidFill>
-            <a:srgbClr val="000000"/>
-          </a:solidFill>
-        </p:spPr>
-        <p:txBody>
-          <a:bodyPr wrap="none" rtlCol="0">
-            <a:spAutoFit/>
-          </a:bodyPr>
-          <a:lstStyle/>
-          <a:p>
-            <a:pPr algn="r">
-              <a:spcAft>
-                <a:spcPts val="600"/>
-              </a:spcAft>
-            </a:pPr>
-            <a:r>
-              <a:rPr lang="en-US" sz="700">
-                <a:solidFill>
-                  <a:srgbClr val="FFFFFF"/>
-                </a:solidFill>
-                <a:hlinkClick r:id="rId3" tooltip="http://www.techug.com/post/react-and-css-in-js.html">
-                  <a:extLst>
-                    <a:ext uri="{A12FA001-AC4F-418D-AE19-62706E023703}">
-                      <ahyp:hlinkClr xmlns:ahyp="http://schemas.microsoft.com/office/drawing/2018/hyperlinkcolor" val="tx"/>
-                    </a:ext>
-                  </a:extLst>
-                </a:hlinkClick>
-              </a:rPr>
-              <a:t>This Photo</a:t>
-            </a:r>
-            <a:r>
-              <a:rPr lang="en-US" sz="700">
-                <a:solidFill>
-                  <a:srgbClr val="FFFFFF"/>
-                </a:solidFill>
-              </a:rPr>
-              <a:t> by Unknown Author is licensed under </a:t>
-            </a:r>
-            <a:r>
-              <a:rPr lang="en-US" sz="700">
-                <a:solidFill>
-                  <a:srgbClr val="FFFFFF"/>
-                </a:solidFill>
-                <a:hlinkClick r:id="rId4" tooltip="https://creativecommons.org/licenses/by-nc-sa/3.0/">
-                  <a:extLst>
-                    <a:ext uri="{A12FA001-AC4F-418D-AE19-62706E023703}">
-                      <ahyp:hlinkClr xmlns:ahyp="http://schemas.microsoft.com/office/drawing/2018/hyperlinkcolor" val="tx"/>
-                    </a:ext>
-                  </a:extLst>
-                </a:hlinkClick>
-              </a:rPr>
-              <a:t>CC BY-NC-SA</a:t>
-            </a:r>
-            <a:endParaRPr lang="en-US" sz="700">
-              <a:solidFill>
-                <a:srgbClr val="FFFFFF"/>
-              </a:solidFill>
-            </a:endParaRPr>
-          </a:p>
-        </p:txBody>
-      </p:sp>
     </p:spTree>
     <p:extLst>
       <p:ext uri="{BB962C8B-B14F-4D97-AF65-F5344CB8AC3E}">

</xml_diff>

<commit_message>
prepping the demo-app and touching up on the Rect.pptx
</commit_message>
<xml_diff>
--- a/PowerPoint/React.pptx
+++ b/PowerPoint/React.pptx
@@ -12,13 +12,11 @@
     <p:sldId id="259" r:id="rId6"/>
     <p:sldId id="260" r:id="rId7"/>
     <p:sldId id="261" r:id="rId8"/>
-    <p:sldId id="263" r:id="rId9"/>
-    <p:sldId id="264" r:id="rId10"/>
-    <p:sldId id="265" r:id="rId11"/>
-    <p:sldId id="267" r:id="rId12"/>
-    <p:sldId id="268" r:id="rId13"/>
-    <p:sldId id="269" r:id="rId14"/>
-    <p:sldId id="270" r:id="rId15"/>
+    <p:sldId id="264" r:id="rId9"/>
+    <p:sldId id="265" r:id="rId10"/>
+    <p:sldId id="267" r:id="rId11"/>
+    <p:sldId id="268" r:id="rId12"/>
+    <p:sldId id="269" r:id="rId13"/>
   </p:sldIdLst>
   <p:sldSz cx="12192000" cy="6858000"/>
   <p:notesSz cx="6858000" cy="9144000"/>
@@ -133,13 +131,11 @@
         </p14:section>
         <p14:section name="Default Section" id="{B59B3F2F-A5EE-41F1-9EA0-A2519934DF4F}">
           <p14:sldIdLst>
-            <p14:sldId id="263"/>
             <p14:sldId id="264"/>
             <p14:sldId id="265"/>
             <p14:sldId id="267"/>
             <p14:sldId id="268"/>
             <p14:sldId id="269"/>
-            <p14:sldId id="270"/>
           </p14:sldIdLst>
         </p14:section>
       </p14:sectionLst>
@@ -298,7 +294,7 @@
           <a:p>
             <a:fld id="{4A105A33-B027-4A7D-BC88-BF07D2F361B2}" type="datetimeFigureOut">
               <a:rPr lang="en-US" smtClean="0"/>
-              <a:t>9/12/2018</a:t>
+              <a:t>9/14/2018</a:t>
             </a:fld>
             <a:endParaRPr lang="en-US"/>
           </a:p>
@@ -496,7 +492,7 @@
           <a:p>
             <a:fld id="{4A105A33-B027-4A7D-BC88-BF07D2F361B2}" type="datetimeFigureOut">
               <a:rPr lang="en-US" smtClean="0"/>
-              <a:t>9/12/2018</a:t>
+              <a:t>9/14/2018</a:t>
             </a:fld>
             <a:endParaRPr lang="en-US"/>
           </a:p>
@@ -704,7 +700,7 @@
           <a:p>
             <a:fld id="{4A105A33-B027-4A7D-BC88-BF07D2F361B2}" type="datetimeFigureOut">
               <a:rPr lang="en-US" smtClean="0"/>
-              <a:t>9/12/2018</a:t>
+              <a:t>9/14/2018</a:t>
             </a:fld>
             <a:endParaRPr lang="en-US"/>
           </a:p>
@@ -902,7 +898,7 @@
           <a:p>
             <a:fld id="{4A105A33-B027-4A7D-BC88-BF07D2F361B2}" type="datetimeFigureOut">
               <a:rPr lang="en-US" smtClean="0"/>
-              <a:t>9/12/2018</a:t>
+              <a:t>9/14/2018</a:t>
             </a:fld>
             <a:endParaRPr lang="en-US"/>
           </a:p>
@@ -1177,7 +1173,7 @@
           <a:p>
             <a:fld id="{4A105A33-B027-4A7D-BC88-BF07D2F361B2}" type="datetimeFigureOut">
               <a:rPr lang="en-US" smtClean="0"/>
-              <a:t>9/12/2018</a:t>
+              <a:t>9/14/2018</a:t>
             </a:fld>
             <a:endParaRPr lang="en-US"/>
           </a:p>
@@ -1442,7 +1438,7 @@
           <a:p>
             <a:fld id="{4A105A33-B027-4A7D-BC88-BF07D2F361B2}" type="datetimeFigureOut">
               <a:rPr lang="en-US" smtClean="0"/>
-              <a:t>9/12/2018</a:t>
+              <a:t>9/14/2018</a:t>
             </a:fld>
             <a:endParaRPr lang="en-US"/>
           </a:p>
@@ -1854,7 +1850,7 @@
           <a:p>
             <a:fld id="{4A105A33-B027-4A7D-BC88-BF07D2F361B2}" type="datetimeFigureOut">
               <a:rPr lang="en-US" smtClean="0"/>
-              <a:t>9/12/2018</a:t>
+              <a:t>9/14/2018</a:t>
             </a:fld>
             <a:endParaRPr lang="en-US"/>
           </a:p>
@@ -1995,7 +1991,7 @@
           <a:p>
             <a:fld id="{4A105A33-B027-4A7D-BC88-BF07D2F361B2}" type="datetimeFigureOut">
               <a:rPr lang="en-US" smtClean="0"/>
-              <a:t>9/12/2018</a:t>
+              <a:t>9/14/2018</a:t>
             </a:fld>
             <a:endParaRPr lang="en-US"/>
           </a:p>
@@ -2108,7 +2104,7 @@
           <a:p>
             <a:fld id="{4A105A33-B027-4A7D-BC88-BF07D2F361B2}" type="datetimeFigureOut">
               <a:rPr lang="en-US" smtClean="0"/>
-              <a:t>9/12/2018</a:t>
+              <a:t>9/14/2018</a:t>
             </a:fld>
             <a:endParaRPr lang="en-US"/>
           </a:p>
@@ -2419,7 +2415,7 @@
           <a:p>
             <a:fld id="{4A105A33-B027-4A7D-BC88-BF07D2F361B2}" type="datetimeFigureOut">
               <a:rPr lang="en-US" smtClean="0"/>
-              <a:t>9/12/2018</a:t>
+              <a:t>9/14/2018</a:t>
             </a:fld>
             <a:endParaRPr lang="en-US"/>
           </a:p>
@@ -2707,7 +2703,7 @@
           <a:p>
             <a:fld id="{4A105A33-B027-4A7D-BC88-BF07D2F361B2}" type="datetimeFigureOut">
               <a:rPr lang="en-US" smtClean="0"/>
-              <a:t>9/12/2018</a:t>
+              <a:t>9/14/2018</a:t>
             </a:fld>
             <a:endParaRPr lang="en-US"/>
           </a:p>
@@ -2948,7 +2944,7 @@
           <a:p>
             <a:fld id="{4A105A33-B027-4A7D-BC88-BF07D2F361B2}" type="datetimeFigureOut">
               <a:rPr lang="en-US" smtClean="0"/>
-              <a:t>9/12/2018</a:t>
+              <a:t>9/14/2018</a:t>
             </a:fld>
             <a:endParaRPr lang="en-US"/>
           </a:p>
@@ -3469,7 +3465,7 @@
           <p:cNvPr id="2" name="Title 1">
             <a:extLst>
               <a:ext uri="{FF2B5EF4-FFF2-40B4-BE49-F238E27FC236}">
-                <a16:creationId xmlns:a16="http://schemas.microsoft.com/office/drawing/2014/main" id="{EE3C5590-FA72-4F58-ABDF-3685C9C7DAAA}"/>
+                <a16:creationId xmlns:a16="http://schemas.microsoft.com/office/drawing/2014/main" id="{C6ADBBF2-F034-4560-AB9F-2EFC5AAC6339}"/>
               </a:ext>
             </a:extLst>
           </p:cNvPr>
@@ -3482,84 +3478,206 @@
         </p:nvSpPr>
         <p:spPr>
           <a:xfrm>
-            <a:off x="640080" y="2074363"/>
-            <a:ext cx="2752354" cy="2709275"/>
+            <a:off x="839788" y="365125"/>
+            <a:ext cx="10515600" cy="644525"/>
           </a:xfrm>
-          <a:prstGeom prst="ellipse">
-            <a:avLst/>
-          </a:prstGeom>
-          <a:solidFill>
-            <a:srgbClr val="262626"/>
-          </a:solidFill>
-          <a:ln w="174625" cmpd="thinThick">
-            <a:solidFill>
-              <a:srgbClr val="262626"/>
-            </a:solidFill>
-          </a:ln>
         </p:spPr>
         <p:txBody>
-          <a:bodyPr vert="horz" lIns="91440" tIns="45720" rIns="91440" bIns="45720" rtlCol="0" anchor="ctr">
-            <a:normAutofit/>
+          <a:bodyPr>
+            <a:normAutofit fontScale="90000"/>
           </a:bodyPr>
           <a:lstStyle/>
           <a:p>
             <a:pPr algn="ctr"/>
             <a:r>
-              <a:rPr lang="en-US" sz="2600" kern="1200">
-                <a:solidFill>
-                  <a:srgbClr val="FFFFFF"/>
-                </a:solidFill>
-                <a:latin typeface="+mj-lt"/>
-                <a:ea typeface="+mj-ea"/>
-                <a:cs typeface="+mj-cs"/>
-              </a:rPr>
-              <a:t>React’s Way</a:t>
-            </a:r>
-          </a:p>
-        </p:txBody>
-      </p:sp>
-      <p:pic>
-        <p:nvPicPr>
-          <p:cNvPr id="5" name="Content Placeholder 4">
-            <a:extLst>
-              <a:ext uri="{FF2B5EF4-FFF2-40B4-BE49-F238E27FC236}">
-                <a16:creationId xmlns:a16="http://schemas.microsoft.com/office/drawing/2014/main" id="{008C653B-2FFA-467E-888B-7D31401900B0}"/>
-              </a:ext>
-            </a:extLst>
-          </p:cNvPr>
-          <p:cNvPicPr>
-            <a:picLocks noGrp="1" noChangeAspect="1"/>
-          </p:cNvPicPr>
-          <p:nvPr>
-            <p:ph idx="1"/>
-          </p:nvPr>
-        </p:nvPicPr>
-        <p:blipFill>
-          <a:blip r:embed="rId2">
-            <a:extLst>
-              <a:ext uri="{28A0092B-C50C-407E-A947-70E740481C1C}">
-                <a14:useLocalDpi xmlns:a14="http://schemas.microsoft.com/office/drawing/2010/main" val="0"/>
-              </a:ext>
-            </a:extLst>
-          </a:blip>
-          <a:stretch>
-            <a:fillRect/>
-          </a:stretch>
-        </p:blipFill>
+              <a:rPr lang="en-US" dirty="0"/>
+              <a:t>Uncontrolled and Controlled components.</a:t>
+            </a:r>
+            <a:br>
+              <a:rPr lang="en-US" dirty="0"/>
+            </a:br>
+            <a:endParaRPr lang="en-US" dirty="0"/>
+          </a:p>
+        </p:txBody>
+      </p:sp>
+      <p:sp>
+        <p:nvSpPr>
+          <p:cNvPr id="3" name="Text Placeholder 2">
+            <a:extLst>
+              <a:ext uri="{FF2B5EF4-FFF2-40B4-BE49-F238E27FC236}">
+                <a16:creationId xmlns:a16="http://schemas.microsoft.com/office/drawing/2014/main" id="{736C2F82-34A4-40D8-8FF6-D474CE3E4DAD}"/>
+              </a:ext>
+            </a:extLst>
+          </p:cNvPr>
+          <p:cNvSpPr>
+            <a:spLocks noGrp="1"/>
+          </p:cNvSpPr>
+          <p:nvPr>
+            <p:ph type="body" idx="1"/>
+          </p:nvPr>
+        </p:nvSpPr>
         <p:spPr>
           <a:xfrm>
-            <a:off x="4550832" y="961812"/>
-            <a:ext cx="6869008" cy="4930987"/>
+            <a:off x="839788" y="1690688"/>
+            <a:ext cx="5157787" cy="823912"/>
+          </a:xfrm>
+        </p:spPr>
+        <p:txBody>
+          <a:bodyPr/>
+          <a:lstStyle/>
+          <a:p>
+            <a:pPr algn="ctr"/>
+            <a:r>
+              <a:rPr lang="en-US" dirty="0"/>
+              <a:t>Controlled</a:t>
+            </a:r>
+          </a:p>
+        </p:txBody>
+      </p:sp>
+      <p:sp>
+        <p:nvSpPr>
+          <p:cNvPr id="4" name="Content Placeholder 3">
+            <a:extLst>
+              <a:ext uri="{FF2B5EF4-FFF2-40B4-BE49-F238E27FC236}">
+                <a16:creationId xmlns:a16="http://schemas.microsoft.com/office/drawing/2014/main" id="{3B146C61-EEB7-4965-91B5-C4927FF00604}"/>
+              </a:ext>
+            </a:extLst>
+          </p:cNvPr>
+          <p:cNvSpPr>
+            <a:spLocks noGrp="1"/>
+          </p:cNvSpPr>
+          <p:nvPr>
+            <p:ph sz="half" idx="2"/>
+          </p:nvPr>
+        </p:nvSpPr>
+        <p:spPr/>
+        <p:txBody>
+          <a:bodyPr/>
+          <a:lstStyle/>
+          <a:p>
+            <a:r>
+              <a:rPr lang="en-US" dirty="0"/>
+              <a:t>You specify the value of the input with a state variable, every time a user enters a value, the state is updated via a function call.</a:t>
+            </a:r>
+          </a:p>
+          <a:p>
+            <a:r>
+              <a:rPr lang="en-US" dirty="0"/>
+              <a:t>Uses the virtual DOM.</a:t>
+            </a:r>
+          </a:p>
+        </p:txBody>
+      </p:sp>
+      <p:sp>
+        <p:nvSpPr>
+          <p:cNvPr id="5" name="Text Placeholder 4">
+            <a:extLst>
+              <a:ext uri="{FF2B5EF4-FFF2-40B4-BE49-F238E27FC236}">
+                <a16:creationId xmlns:a16="http://schemas.microsoft.com/office/drawing/2014/main" id="{91A94C35-8667-4899-BC73-0A29D7B29325}"/>
+              </a:ext>
+            </a:extLst>
+          </p:cNvPr>
+          <p:cNvSpPr>
+            <a:spLocks noGrp="1"/>
+          </p:cNvSpPr>
+          <p:nvPr>
+            <p:ph type="body" sz="quarter" idx="3"/>
+          </p:nvPr>
+        </p:nvSpPr>
+        <p:spPr>
+          <a:xfrm>
+            <a:off x="6172200" y="1681163"/>
+            <a:ext cx="5183188" cy="823912"/>
+          </a:xfrm>
+        </p:spPr>
+        <p:txBody>
+          <a:bodyPr/>
+          <a:lstStyle/>
+          <a:p>
+            <a:pPr algn="ctr"/>
+            <a:r>
+              <a:rPr lang="en-US" dirty="0"/>
+              <a:t>Uncontrolled</a:t>
+            </a:r>
+          </a:p>
+        </p:txBody>
+      </p:sp>
+      <p:sp>
+        <p:nvSpPr>
+          <p:cNvPr id="6" name="Content Placeholder 5">
+            <a:extLst>
+              <a:ext uri="{FF2B5EF4-FFF2-40B4-BE49-F238E27FC236}">
+                <a16:creationId xmlns:a16="http://schemas.microsoft.com/office/drawing/2014/main" id="{9AE9532C-1224-457B-ADD1-B084F508DE32}"/>
+              </a:ext>
+            </a:extLst>
+          </p:cNvPr>
+          <p:cNvSpPr>
+            <a:spLocks noGrp="1"/>
+          </p:cNvSpPr>
+          <p:nvPr>
+            <p:ph sz="quarter" idx="4"/>
+          </p:nvPr>
+        </p:nvSpPr>
+        <p:spPr/>
+        <p:txBody>
+          <a:bodyPr/>
+          <a:lstStyle/>
+          <a:p>
+            <a:r>
+              <a:rPr lang="en-US" dirty="0"/>
+              <a:t>Uses the DOM.</a:t>
+            </a:r>
+          </a:p>
+          <a:p>
+            <a:r>
+              <a:rPr lang="en-US" dirty="0"/>
+              <a:t>Binds to DOM elements using the Ref keyword, or using a event object.</a:t>
+            </a:r>
+          </a:p>
+          <a:p>
+            <a:endParaRPr lang="en-US" dirty="0"/>
+          </a:p>
+        </p:txBody>
+      </p:sp>
+      <p:sp>
+        <p:nvSpPr>
+          <p:cNvPr id="7" name="TextBox 6">
+            <a:extLst>
+              <a:ext uri="{FF2B5EF4-FFF2-40B4-BE49-F238E27FC236}">
+                <a16:creationId xmlns:a16="http://schemas.microsoft.com/office/drawing/2014/main" id="{11B02B32-1951-4C07-93AD-317C7BC2D32E}"/>
+              </a:ext>
+            </a:extLst>
+          </p:cNvPr>
+          <p:cNvSpPr txBox="1"/>
+          <p:nvPr/>
+        </p:nvSpPr>
+        <p:spPr>
+          <a:xfrm>
+            <a:off x="2972594" y="1084541"/>
+            <a:ext cx="6246812" cy="369332"/>
           </a:xfrm>
           <a:prstGeom prst="rect">
             <a:avLst/>
           </a:prstGeom>
+          <a:noFill/>
         </p:spPr>
-      </p:pic>
+        <p:txBody>
+          <a:bodyPr wrap="square" rtlCol="0">
+            <a:spAutoFit/>
+          </a:bodyPr>
+          <a:lstStyle/>
+          <a:p>
+            <a:r>
+              <a:rPr lang="en-US" dirty="0"/>
+              <a:t>Describes the method of obtaining input data from HTML inputs.</a:t>
+            </a:r>
+          </a:p>
+        </p:txBody>
+      </p:sp>
     </p:spTree>
     <p:extLst>
       <p:ext uri="{BB962C8B-B14F-4D97-AF65-F5344CB8AC3E}">
-        <p14:creationId xmlns:p14="http://schemas.microsoft.com/office/powerpoint/2010/main" val="3463946540"/>
+        <p14:creationId xmlns:p14="http://schemas.microsoft.com/office/powerpoint/2010/main" val="3796533581"/>
       </p:ext>
     </p:extLst>
   </p:cSld>
@@ -3588,193 +3706,148 @@
       </p:grpSpPr>
       <p:sp>
         <p:nvSpPr>
-          <p:cNvPr id="2" name="Title 1">
-            <a:extLst>
-              <a:ext uri="{FF2B5EF4-FFF2-40B4-BE49-F238E27FC236}">
-                <a16:creationId xmlns:a16="http://schemas.microsoft.com/office/drawing/2014/main" id="{C6ADBBF2-F034-4560-AB9F-2EFC5AAC6339}"/>
-              </a:ext>
-            </a:extLst>
-          </p:cNvPr>
-          <p:cNvSpPr>
+          <p:cNvPr id="17" name="Content Placeholder 16">
+            <a:extLst>
+              <a:ext uri="{FF2B5EF4-FFF2-40B4-BE49-F238E27FC236}">
+                <a16:creationId xmlns:a16="http://schemas.microsoft.com/office/drawing/2014/main" id="{B09081B2-C783-410B-ADC8-AB41862B39A0}"/>
+              </a:ext>
+            </a:extLst>
+          </p:cNvPr>
+          <p:cNvSpPr>
+            <a:spLocks noGrp="1"/>
+          </p:cNvSpPr>
+          <p:nvPr>
+            <p:ph sz="half" idx="1"/>
+          </p:nvPr>
+        </p:nvSpPr>
+        <p:spPr/>
+        <p:txBody>
+          <a:bodyPr/>
+          <a:lstStyle/>
+          <a:p>
+            <a:pPr marL="0" indent="0" algn="ctr">
+              <a:buNone/>
+            </a:pPr>
+            <a:r>
+              <a:rPr lang="en-US" dirty="0"/>
+              <a:t>Class Component </a:t>
+            </a:r>
+          </a:p>
+          <a:p>
+            <a:r>
+              <a:rPr lang="en-US" dirty="0"/>
+              <a:t>Component is a class.</a:t>
+            </a:r>
+          </a:p>
+          <a:p>
+            <a:r>
+              <a:rPr lang="en-US" dirty="0"/>
+              <a:t>Has access to state/props, and to the React component life cycle.</a:t>
+            </a:r>
+          </a:p>
+          <a:p>
+            <a:r>
+              <a:rPr lang="en-US" dirty="0"/>
+              <a:t>I have included links in the README.md to some resources on component life cycle.</a:t>
+            </a:r>
+          </a:p>
+        </p:txBody>
+      </p:sp>
+      <p:sp>
+        <p:nvSpPr>
+          <p:cNvPr id="18" name="Content Placeholder 17">
+            <a:extLst>
+              <a:ext uri="{FF2B5EF4-FFF2-40B4-BE49-F238E27FC236}">
+                <a16:creationId xmlns:a16="http://schemas.microsoft.com/office/drawing/2014/main" id="{016BAF52-E502-4986-BB8A-93EF4FCCBB88}"/>
+              </a:ext>
+            </a:extLst>
+          </p:cNvPr>
+          <p:cNvSpPr>
+            <a:spLocks noGrp="1"/>
+          </p:cNvSpPr>
+          <p:nvPr>
+            <p:ph sz="half" idx="2"/>
+          </p:nvPr>
+        </p:nvSpPr>
+        <p:spPr/>
+        <p:txBody>
+          <a:bodyPr/>
+          <a:lstStyle/>
+          <a:p>
+            <a:pPr marL="0" indent="0" algn="ctr">
+              <a:buNone/>
+            </a:pPr>
+            <a:r>
+              <a:rPr lang="en-US" dirty="0"/>
+              <a:t>Functional Component</a:t>
+            </a:r>
+          </a:p>
+          <a:p>
+            <a:r>
+              <a:rPr lang="en-US" dirty="0"/>
+              <a:t>Component is a function, that takes props as a parameter.</a:t>
+            </a:r>
+          </a:p>
+          <a:p>
+            <a:r>
+              <a:rPr lang="en-US" dirty="0"/>
+              <a:t>Can only receive props.</a:t>
+            </a:r>
+          </a:p>
+          <a:p>
+            <a:r>
+              <a:rPr lang="en-US" dirty="0"/>
+              <a:t>Can’t store state locally.</a:t>
+            </a:r>
+          </a:p>
+          <a:p>
+            <a:endParaRPr lang="en-US" dirty="0"/>
+          </a:p>
+        </p:txBody>
+      </p:sp>
+      <p:sp>
+        <p:nvSpPr>
+          <p:cNvPr id="19" name="Title 18">
+            <a:extLst>
+              <a:ext uri="{FF2B5EF4-FFF2-40B4-BE49-F238E27FC236}">
+                <a16:creationId xmlns:a16="http://schemas.microsoft.com/office/drawing/2014/main" id="{F2E1598D-7A37-4546-8742-1B99A83A83FA}"/>
+              </a:ext>
+            </a:extLst>
+          </p:cNvPr>
+          <p:cNvSpPr txBox="1">
             <a:spLocks noGrp="1"/>
           </p:cNvSpPr>
           <p:nvPr>
             <p:ph type="title"/>
           </p:nvPr>
         </p:nvSpPr>
-        <p:spPr/>
-        <p:txBody>
-          <a:bodyPr/>
-          <a:lstStyle/>
-          <a:p>
-            <a:pPr algn="ctr"/>
-            <a:r>
-              <a:rPr lang="en-US" dirty="0"/>
-              <a:t>Uncontrolled and Controlled components.</a:t>
-            </a:r>
-          </a:p>
-        </p:txBody>
-      </p:sp>
-      <p:sp>
-        <p:nvSpPr>
-          <p:cNvPr id="3" name="Text Placeholder 2">
-            <a:extLst>
-              <a:ext uri="{FF2B5EF4-FFF2-40B4-BE49-F238E27FC236}">
-                <a16:creationId xmlns:a16="http://schemas.microsoft.com/office/drawing/2014/main" id="{736C2F82-34A4-40D8-8FF6-D474CE3E4DAD}"/>
-              </a:ext>
-            </a:extLst>
-          </p:cNvPr>
-          <p:cNvSpPr>
-            <a:spLocks noGrp="1"/>
-          </p:cNvSpPr>
-          <p:nvPr>
-            <p:ph type="body" idx="1"/>
-          </p:nvPr>
-        </p:nvSpPr>
-        <p:spPr/>
-        <p:txBody>
-          <a:bodyPr/>
-          <a:lstStyle/>
-          <a:p>
-            <a:pPr algn="ctr"/>
-            <a:r>
-              <a:rPr lang="en-US" dirty="0"/>
-              <a:t>Uncontrolled</a:t>
-            </a:r>
-          </a:p>
-        </p:txBody>
-      </p:sp>
-      <p:sp>
-        <p:nvSpPr>
-          <p:cNvPr id="4" name="Content Placeholder 3">
-            <a:extLst>
-              <a:ext uri="{FF2B5EF4-FFF2-40B4-BE49-F238E27FC236}">
-                <a16:creationId xmlns:a16="http://schemas.microsoft.com/office/drawing/2014/main" id="{3B146C61-EEB7-4965-91B5-C4927FF00604}"/>
-              </a:ext>
-            </a:extLst>
-          </p:cNvPr>
-          <p:cNvSpPr>
-            <a:spLocks noGrp="1"/>
-          </p:cNvSpPr>
-          <p:nvPr>
-            <p:ph sz="half" idx="2"/>
-          </p:nvPr>
-        </p:nvSpPr>
-        <p:spPr/>
-        <p:txBody>
-          <a:bodyPr/>
-          <a:lstStyle/>
-          <a:p>
-            <a:r>
-              <a:rPr lang="en-US" dirty="0"/>
-              <a:t>Stores state locally.</a:t>
-            </a:r>
-          </a:p>
-          <a:p>
-            <a:r>
-              <a:rPr lang="en-US" dirty="0"/>
-              <a:t>Has methods that can alter the DOM.</a:t>
-            </a:r>
-          </a:p>
-          <a:p>
-            <a:r>
-              <a:rPr lang="en-US" dirty="0"/>
-              <a:t>Passes data to other components as props.</a:t>
-            </a:r>
-          </a:p>
-          <a:p>
-            <a:r>
-              <a:rPr lang="en-US" dirty="0"/>
-              <a:t>Uses the virtual DOM.</a:t>
-            </a:r>
-          </a:p>
-          <a:p>
-            <a:endParaRPr lang="en-US" dirty="0"/>
-          </a:p>
-        </p:txBody>
-      </p:sp>
-      <p:sp>
-        <p:nvSpPr>
-          <p:cNvPr id="5" name="Text Placeholder 4">
-            <a:extLst>
-              <a:ext uri="{FF2B5EF4-FFF2-40B4-BE49-F238E27FC236}">
-                <a16:creationId xmlns:a16="http://schemas.microsoft.com/office/drawing/2014/main" id="{91A94C35-8667-4899-BC73-0A29D7B29325}"/>
-              </a:ext>
-            </a:extLst>
-          </p:cNvPr>
-          <p:cNvSpPr>
-            <a:spLocks noGrp="1"/>
-          </p:cNvSpPr>
-          <p:nvPr>
-            <p:ph type="body" sz="quarter" idx="3"/>
-          </p:nvPr>
-        </p:nvSpPr>
-        <p:spPr/>
-        <p:txBody>
-          <a:bodyPr/>
-          <a:lstStyle/>
-          <a:p>
-            <a:pPr algn="ctr"/>
-            <a:r>
-              <a:rPr lang="en-US" dirty="0"/>
-              <a:t>Controlled</a:t>
-            </a:r>
-          </a:p>
-        </p:txBody>
-      </p:sp>
-      <p:sp>
-        <p:nvSpPr>
-          <p:cNvPr id="6" name="Content Placeholder 5">
-            <a:extLst>
-              <a:ext uri="{FF2B5EF4-FFF2-40B4-BE49-F238E27FC236}">
-                <a16:creationId xmlns:a16="http://schemas.microsoft.com/office/drawing/2014/main" id="{9AE9532C-1224-457B-ADD1-B084F508DE32}"/>
-              </a:ext>
-            </a:extLst>
-          </p:cNvPr>
-          <p:cNvSpPr>
-            <a:spLocks noGrp="1"/>
-          </p:cNvSpPr>
-          <p:nvPr>
-            <p:ph sz="quarter" idx="4"/>
-          </p:nvPr>
-        </p:nvSpPr>
-        <p:spPr/>
-        <p:txBody>
-          <a:bodyPr/>
-          <a:lstStyle/>
-          <a:p>
-            <a:r>
-              <a:rPr lang="en-US" dirty="0"/>
-              <a:t>Outputs values through props.</a:t>
-            </a:r>
-          </a:p>
-          <a:p>
-            <a:r>
-              <a:rPr lang="en-US" dirty="0"/>
-              <a:t>Notifies changes through callbacks to the parent component.</a:t>
-            </a:r>
-          </a:p>
-          <a:p>
-            <a:r>
-              <a:rPr lang="en-US" dirty="0"/>
-              <a:t>Uses the DOM.</a:t>
-            </a:r>
-          </a:p>
-          <a:p>
-            <a:r>
-              <a:rPr lang="en-US" dirty="0"/>
-              <a:t>Binds to DOM elements using the Ref keyword.</a:t>
-            </a:r>
-          </a:p>
-          <a:p>
-            <a:endParaRPr lang="en-US" dirty="0"/>
+        <p:spPr>
+          <a:xfrm>
+            <a:off x="838200" y="365125"/>
+            <a:ext cx="10515600" cy="1325563"/>
+          </a:xfrm>
+          <a:prstGeom prst="rect">
+            <a:avLst/>
+          </a:prstGeom>
+          <a:noFill/>
+        </p:spPr>
+        <p:txBody>
+          <a:bodyPr wrap="square" rtlCol="0">
+            <a:spAutoFit/>
+          </a:bodyPr>
+          <a:lstStyle/>
+          <a:p>
+            <a:r>
+              <a:rPr lang="en-US" sz="4400" dirty="0"/>
+              <a:t>Class Components vs. Functional Components</a:t>
+            </a:r>
           </a:p>
         </p:txBody>
       </p:sp>
     </p:spTree>
     <p:extLst>
       <p:ext uri="{BB962C8B-B14F-4D97-AF65-F5344CB8AC3E}">
-        <p14:creationId xmlns:p14="http://schemas.microsoft.com/office/powerpoint/2010/main" val="3796533581"/>
+        <p14:creationId xmlns:p14="http://schemas.microsoft.com/office/powerpoint/2010/main" val="3984940880"/>
       </p:ext>
     </p:extLst>
   </p:cSld>
@@ -3801,178 +3874,6 @@
           <a:chExt cx="0" cy="0"/>
         </a:xfrm>
       </p:grpSpPr>
-      <p:pic>
-        <p:nvPicPr>
-          <p:cNvPr id="11" name="Content Placeholder 10">
-            <a:extLst>
-              <a:ext uri="{FF2B5EF4-FFF2-40B4-BE49-F238E27FC236}">
-                <a16:creationId xmlns:a16="http://schemas.microsoft.com/office/drawing/2014/main" id="{3681E37E-1E7A-490B-AD4E-88072AC98926}"/>
-              </a:ext>
-            </a:extLst>
-          </p:cNvPr>
-          <p:cNvPicPr>
-            <a:picLocks noGrp="1" noChangeAspect="1"/>
-          </p:cNvPicPr>
-          <p:nvPr>
-            <p:ph sz="half" idx="2"/>
-          </p:nvPr>
-        </p:nvPicPr>
-        <p:blipFill>
-          <a:blip r:embed="rId2">
-            <a:extLst>
-              <a:ext uri="{28A0092B-C50C-407E-A947-70E740481C1C}">
-                <a14:useLocalDpi xmlns:a14="http://schemas.microsoft.com/office/drawing/2010/main" val="0"/>
-              </a:ext>
-            </a:extLst>
-          </a:blip>
-          <a:stretch>
-            <a:fillRect/>
-          </a:stretch>
-        </p:blipFill>
-        <p:spPr>
-          <a:xfrm>
-            <a:off x="5749256" y="763399"/>
-            <a:ext cx="6163111" cy="3379393"/>
-          </a:xfrm>
-        </p:spPr>
-      </p:pic>
-      <p:pic>
-        <p:nvPicPr>
-          <p:cNvPr id="9" name="Content Placeholder 8">
-            <a:extLst>
-              <a:ext uri="{FF2B5EF4-FFF2-40B4-BE49-F238E27FC236}">
-                <a16:creationId xmlns:a16="http://schemas.microsoft.com/office/drawing/2014/main" id="{559A53EE-CDE1-4D33-96CB-A3EF87C2B308}"/>
-              </a:ext>
-            </a:extLst>
-          </p:cNvPr>
-          <p:cNvPicPr>
-            <a:picLocks noGrp="1" noChangeAspect="1"/>
-          </p:cNvPicPr>
-          <p:nvPr>
-            <p:ph sz="half" idx="1"/>
-          </p:nvPr>
-        </p:nvPicPr>
-        <p:blipFill>
-          <a:blip r:embed="rId3">
-            <a:extLst>
-              <a:ext uri="{28A0092B-C50C-407E-A947-70E740481C1C}">
-                <a14:useLocalDpi xmlns:a14="http://schemas.microsoft.com/office/drawing/2010/main" val="0"/>
-              </a:ext>
-            </a:extLst>
-          </a:blip>
-          <a:stretch>
-            <a:fillRect/>
-          </a:stretch>
-        </p:blipFill>
-        <p:spPr>
-          <a:xfrm>
-            <a:off x="453006" y="763399"/>
-            <a:ext cx="5181600" cy="5413564"/>
-          </a:xfrm>
-        </p:spPr>
-      </p:pic>
-      <p:sp>
-        <p:nvSpPr>
-          <p:cNvPr id="13" name="TextBox 12">
-            <a:extLst>
-              <a:ext uri="{FF2B5EF4-FFF2-40B4-BE49-F238E27FC236}">
-                <a16:creationId xmlns:a16="http://schemas.microsoft.com/office/drawing/2014/main" id="{12F5FBFA-9F1F-470D-95CB-5BB6E86B42DA}"/>
-              </a:ext>
-            </a:extLst>
-          </p:cNvPr>
-          <p:cNvSpPr txBox="1"/>
-          <p:nvPr/>
-        </p:nvSpPr>
-        <p:spPr>
-          <a:xfrm>
-            <a:off x="709127" y="214604"/>
-            <a:ext cx="4441371" cy="369332"/>
-          </a:xfrm>
-          <a:prstGeom prst="rect">
-            <a:avLst/>
-          </a:prstGeom>
-          <a:noFill/>
-        </p:spPr>
-        <p:txBody>
-          <a:bodyPr wrap="square" rtlCol="0">
-            <a:spAutoFit/>
-          </a:bodyPr>
-          <a:lstStyle/>
-          <a:p>
-            <a:pPr algn="ctr"/>
-            <a:r>
-              <a:rPr lang="en-US" dirty="0"/>
-              <a:t>Uncontrolled</a:t>
-            </a:r>
-          </a:p>
-        </p:txBody>
-      </p:sp>
-      <p:sp>
-        <p:nvSpPr>
-          <p:cNvPr id="14" name="TextBox 13">
-            <a:extLst>
-              <a:ext uri="{FF2B5EF4-FFF2-40B4-BE49-F238E27FC236}">
-                <a16:creationId xmlns:a16="http://schemas.microsoft.com/office/drawing/2014/main" id="{5D4D0DFA-5F11-45B0-921D-BE60EE989E8F}"/>
-              </a:ext>
-            </a:extLst>
-          </p:cNvPr>
-          <p:cNvSpPr txBox="1"/>
-          <p:nvPr/>
-        </p:nvSpPr>
-        <p:spPr>
-          <a:xfrm>
-            <a:off x="5634606" y="214604"/>
-            <a:ext cx="6071404" cy="369332"/>
-          </a:xfrm>
-          <a:prstGeom prst="rect">
-            <a:avLst/>
-          </a:prstGeom>
-          <a:noFill/>
-        </p:spPr>
-        <p:txBody>
-          <a:bodyPr wrap="square" rtlCol="0">
-            <a:spAutoFit/>
-          </a:bodyPr>
-          <a:lstStyle/>
-          <a:p>
-            <a:pPr algn="ctr"/>
-            <a:r>
-              <a:rPr lang="en-US" dirty="0"/>
-              <a:t>Controlled</a:t>
-            </a:r>
-          </a:p>
-        </p:txBody>
-      </p:sp>
-    </p:spTree>
-    <p:extLst>
-      <p:ext uri="{BB962C8B-B14F-4D97-AF65-F5344CB8AC3E}">
-        <p14:creationId xmlns:p14="http://schemas.microsoft.com/office/powerpoint/2010/main" val="3984940880"/>
-      </p:ext>
-    </p:extLst>
-  </p:cSld>
-  <p:clrMapOvr>
-    <a:masterClrMapping/>
-  </p:clrMapOvr>
-</p:sld>
-</file>
-
-<file path=ppt/slides/slide13.xml><?xml version="1.0" encoding="utf-8"?>
-<p:sld xmlns:a="http://schemas.openxmlformats.org/drawingml/2006/main" xmlns:r="http://schemas.openxmlformats.org/officeDocument/2006/relationships" xmlns:p="http://schemas.openxmlformats.org/presentationml/2006/main">
-  <p:cSld>
-    <p:spTree>
-      <p:nvGrpSpPr>
-        <p:cNvPr id="1" name=""/>
-        <p:cNvGrpSpPr/>
-        <p:nvPr/>
-      </p:nvGrpSpPr>
-      <p:grpSpPr>
-        <a:xfrm>
-          <a:off x="0" y="0"/>
-          <a:ext cx="0" cy="0"/>
-          <a:chOff x="0" y="0"/>
-          <a:chExt cx="0" cy="0"/>
-        </a:xfrm>
-      </p:grpSpPr>
       <p:sp>
         <p:nvSpPr>
           <p:cNvPr id="2" name="Title 1">
@@ -4054,7 +3955,7 @@
           <a:p>
             <a:r>
               <a:rPr lang="en-US" dirty="0"/>
-              <a:t>State lives locally/internally on a Uncontrolled component.</a:t>
+              <a:t>State lives locally/internally on a class component.</a:t>
             </a:r>
           </a:p>
           <a:p>
@@ -4123,7 +4024,7 @@
           <a:p>
             <a:r>
               <a:rPr lang="en-US" dirty="0"/>
-              <a:t>Props are values, passed down from parent components. </a:t>
+              <a:t>Props are values, passed down from a parent component. </a:t>
             </a:r>
           </a:p>
           <a:p>
@@ -4135,7 +4036,7 @@
           <a:p>
             <a:r>
               <a:rPr lang="en-US" dirty="0"/>
-              <a:t>Props are mainly used on controlled components.</a:t>
+              <a:t>Props are mainly used on Functional/Pure components.</a:t>
             </a:r>
           </a:p>
         </p:txBody>
@@ -4144,143 +4045,6 @@
     <p:extLst>
       <p:ext uri="{BB962C8B-B14F-4D97-AF65-F5344CB8AC3E}">
         <p14:creationId xmlns:p14="http://schemas.microsoft.com/office/powerpoint/2010/main" val="2829444479"/>
-      </p:ext>
-    </p:extLst>
-  </p:cSld>
-  <p:clrMapOvr>
-    <a:masterClrMapping/>
-  </p:clrMapOvr>
-</p:sld>
-</file>
-
-<file path=ppt/slides/slide14.xml><?xml version="1.0" encoding="utf-8"?>
-<p:sld xmlns:a="http://schemas.openxmlformats.org/drawingml/2006/main" xmlns:r="http://schemas.openxmlformats.org/officeDocument/2006/relationships" xmlns:p="http://schemas.openxmlformats.org/presentationml/2006/main">
-  <p:cSld>
-    <p:spTree>
-      <p:nvGrpSpPr>
-        <p:cNvPr id="1" name=""/>
-        <p:cNvGrpSpPr/>
-        <p:nvPr/>
-      </p:nvGrpSpPr>
-      <p:grpSpPr>
-        <a:xfrm>
-          <a:off x="0" y="0"/>
-          <a:ext cx="0" cy="0"/>
-          <a:chOff x="0" y="0"/>
-          <a:chExt cx="0" cy="0"/>
-        </a:xfrm>
-      </p:grpSpPr>
-      <p:sp>
-        <p:nvSpPr>
-          <p:cNvPr id="2" name="Title 1">
-            <a:extLst>
-              <a:ext uri="{FF2B5EF4-FFF2-40B4-BE49-F238E27FC236}">
-                <a16:creationId xmlns:a16="http://schemas.microsoft.com/office/drawing/2014/main" id="{9BE52E93-A310-4B60-9249-615D8F3639DD}"/>
-              </a:ext>
-            </a:extLst>
-          </p:cNvPr>
-          <p:cNvSpPr>
-            <a:spLocks noGrp="1"/>
-          </p:cNvSpPr>
-          <p:nvPr>
-            <p:ph type="title"/>
-          </p:nvPr>
-        </p:nvSpPr>
-        <p:spPr/>
-        <p:txBody>
-          <a:bodyPr/>
-          <a:lstStyle/>
-          <a:p>
-            <a:pPr algn="ctr"/>
-            <a:r>
-              <a:rPr lang="en-US" dirty="0"/>
-              <a:t>How do Components Update?</a:t>
-            </a:r>
-          </a:p>
-        </p:txBody>
-      </p:sp>
-      <p:sp>
-        <p:nvSpPr>
-          <p:cNvPr id="3" name="Content Placeholder 2">
-            <a:extLst>
-              <a:ext uri="{FF2B5EF4-FFF2-40B4-BE49-F238E27FC236}">
-                <a16:creationId xmlns:a16="http://schemas.microsoft.com/office/drawing/2014/main" id="{76763DE9-D993-4BCA-AD79-C95BB9C55DC3}"/>
-              </a:ext>
-            </a:extLst>
-          </p:cNvPr>
-          <p:cNvSpPr>
-            <a:spLocks noGrp="1"/>
-          </p:cNvSpPr>
-          <p:nvPr>
-            <p:ph idx="1"/>
-          </p:nvPr>
-        </p:nvSpPr>
-        <p:spPr/>
-        <p:txBody>
-          <a:bodyPr/>
-          <a:lstStyle/>
-          <a:p>
-            <a:r>
-              <a:rPr lang="en-US" dirty="0"/>
-              <a:t>With the </a:t>
-            </a:r>
-            <a:r>
-              <a:rPr lang="en-US" dirty="0" err="1"/>
-              <a:t>setState</a:t>
-            </a:r>
-            <a:r>
-              <a:rPr lang="en-US" dirty="0"/>
-              <a:t>() method, this method updates state, and updates all sub components that use that state property.</a:t>
-            </a:r>
-          </a:p>
-          <a:p>
-            <a:r>
-              <a:rPr lang="en-US" dirty="0"/>
-              <a:t>This process is automatic, but the </a:t>
-            </a:r>
-            <a:r>
-              <a:rPr lang="en-US" dirty="0" err="1"/>
-              <a:t>setState</a:t>
-            </a:r>
-            <a:r>
-              <a:rPr lang="en-US" dirty="0"/>
-              <a:t>() method, is used in only uncontrolled components. </a:t>
-            </a:r>
-          </a:p>
-          <a:p>
-            <a:r>
-              <a:rPr lang="en-US" dirty="0"/>
-              <a:t>The </a:t>
-            </a:r>
-            <a:r>
-              <a:rPr lang="en-US" dirty="0" err="1"/>
-              <a:t>setState</a:t>
-            </a:r>
-            <a:r>
-              <a:rPr lang="en-US" dirty="0"/>
-              <a:t>() can take a parameter, which is the previous state.</a:t>
-            </a:r>
-          </a:p>
-          <a:p>
-            <a:r>
-              <a:rPr lang="en-US" dirty="0"/>
-              <a:t>The </a:t>
-            </a:r>
-            <a:r>
-              <a:rPr lang="en-US" dirty="0" err="1"/>
-              <a:t>setState</a:t>
-            </a:r>
-            <a:r>
-              <a:rPr lang="en-US" dirty="0"/>
-              <a:t>() can take a callback function, that can access the new updated state.</a:t>
-            </a:r>
-          </a:p>
-        </p:txBody>
-      </p:sp>
-    </p:spTree>
-    <p:extLst>
-      <p:ext uri="{BB962C8B-B14F-4D97-AF65-F5344CB8AC3E}">
-        <p14:creationId xmlns:p14="http://schemas.microsoft.com/office/powerpoint/2010/main" val="2993631761"/>
       </p:ext>
     </p:extLst>
   </p:cSld>
@@ -5633,138 +5397,6 @@
           <p:cNvPr id="2" name="Title 1">
             <a:extLst>
               <a:ext uri="{FF2B5EF4-FFF2-40B4-BE49-F238E27FC236}">
-                <a16:creationId xmlns:a16="http://schemas.microsoft.com/office/drawing/2014/main" id="{4FB220B6-CF60-49F8-88B6-E4691D66DDAB}"/>
-              </a:ext>
-            </a:extLst>
-          </p:cNvPr>
-          <p:cNvSpPr>
-            <a:spLocks noGrp="1"/>
-          </p:cNvSpPr>
-          <p:nvPr>
-            <p:ph type="ctrTitle"/>
-          </p:nvPr>
-        </p:nvSpPr>
-        <p:spPr>
-          <a:xfrm>
-            <a:off x="1330960" y="685483"/>
-            <a:ext cx="9144000" cy="2387600"/>
-          </a:xfrm>
-        </p:spPr>
-        <p:txBody>
-          <a:bodyPr>
-            <a:normAutofit fontScale="90000"/>
-          </a:bodyPr>
-          <a:lstStyle/>
-          <a:p>
-            <a:r>
-              <a:rPr lang="en-US" dirty="0" err="1"/>
-              <a:t>React’s</a:t>
-            </a:r>
-            <a:r>
-              <a:rPr lang="en-US" dirty="0"/>
-              <a:t> Separation of Concerns</a:t>
-            </a:r>
-            <a:br>
-              <a:rPr lang="en-US" dirty="0"/>
-            </a:br>
-            <a:endParaRPr lang="en-US" dirty="0"/>
-          </a:p>
-        </p:txBody>
-      </p:sp>
-      <p:sp>
-        <p:nvSpPr>
-          <p:cNvPr id="3" name="Subtitle 2">
-            <a:extLst>
-              <a:ext uri="{FF2B5EF4-FFF2-40B4-BE49-F238E27FC236}">
-                <a16:creationId xmlns:a16="http://schemas.microsoft.com/office/drawing/2014/main" id="{8BB33353-7AAF-4CC9-8AD0-D540B3E0655D}"/>
-              </a:ext>
-            </a:extLst>
-          </p:cNvPr>
-          <p:cNvSpPr>
-            <a:spLocks noGrp="1"/>
-          </p:cNvSpPr>
-          <p:nvPr>
-            <p:ph type="subTitle" idx="1"/>
-          </p:nvPr>
-        </p:nvSpPr>
-        <p:spPr/>
-        <p:txBody>
-          <a:bodyPr/>
-          <a:lstStyle/>
-          <a:p>
-            <a:pPr marL="342900" indent="-342900" algn="l">
-              <a:buFont typeface="Arial" panose="020B0604020202020204" pitchFamily="34" charset="0"/>
-              <a:buChar char="•"/>
-            </a:pPr>
-            <a:r>
-              <a:rPr lang="en-US" dirty="0"/>
-              <a:t>Separation of Concerns.</a:t>
-            </a:r>
-          </a:p>
-          <a:p>
-            <a:pPr marL="342900" indent="-342900" algn="l">
-              <a:buFont typeface="Arial" panose="020B0604020202020204" pitchFamily="34" charset="0"/>
-              <a:buChar char="•"/>
-            </a:pPr>
-            <a:r>
-              <a:rPr lang="en-US" dirty="0" err="1"/>
-              <a:t>React’s</a:t>
-            </a:r>
-            <a:r>
-              <a:rPr lang="en-US" dirty="0"/>
-              <a:t> way?</a:t>
-            </a:r>
-          </a:p>
-          <a:p>
-            <a:pPr marL="342900" indent="-342900" algn="l">
-              <a:buFont typeface="Arial" panose="020B0604020202020204" pitchFamily="34" charset="0"/>
-              <a:buChar char="•"/>
-            </a:pPr>
-            <a:r>
-              <a:rPr lang="en-US" u="sng" dirty="0">
-                <a:hlinkClick r:id="rId2"/>
-              </a:rPr>
-              <a:t>https://reactjs.org/docs/introducing-jsx.html#why-jsx</a:t>
-            </a:r>
-            <a:endParaRPr lang="en-US" dirty="0"/>
-          </a:p>
-        </p:txBody>
-      </p:sp>
-    </p:spTree>
-    <p:extLst>
-      <p:ext uri="{BB962C8B-B14F-4D97-AF65-F5344CB8AC3E}">
-        <p14:creationId xmlns:p14="http://schemas.microsoft.com/office/powerpoint/2010/main" val="3383207141"/>
-      </p:ext>
-    </p:extLst>
-  </p:cSld>
-  <p:clrMapOvr>
-    <a:masterClrMapping/>
-  </p:clrMapOvr>
-</p:sld>
-</file>
-
-<file path=ppt/slides/slide9.xml><?xml version="1.0" encoding="utf-8"?>
-<p:sld xmlns:a="http://schemas.openxmlformats.org/drawingml/2006/main" xmlns:r="http://schemas.openxmlformats.org/officeDocument/2006/relationships" xmlns:p="http://schemas.openxmlformats.org/presentationml/2006/main">
-  <p:cSld>
-    <p:spTree>
-      <p:nvGrpSpPr>
-        <p:cNvPr id="1" name=""/>
-        <p:cNvGrpSpPr/>
-        <p:nvPr/>
-      </p:nvGrpSpPr>
-      <p:grpSpPr>
-        <a:xfrm>
-          <a:off x="0" y="0"/>
-          <a:ext cx="0" cy="0"/>
-          <a:chOff x="0" y="0"/>
-          <a:chExt cx="0" cy="0"/>
-        </a:xfrm>
-      </p:grpSpPr>
-      <p:sp>
-        <p:nvSpPr>
-          <p:cNvPr id="2" name="Title 1">
-            <a:extLst>
-              <a:ext uri="{FF2B5EF4-FFF2-40B4-BE49-F238E27FC236}">
                 <a16:creationId xmlns:a16="http://schemas.microsoft.com/office/drawing/2014/main" id="{2BA0C0DA-C0BD-41DC-AD05-7B3A71AD7196}"/>
               </a:ext>
             </a:extLst>
@@ -5848,6 +5480,262 @@
     <p:extLst>
       <p:ext uri="{BB962C8B-B14F-4D97-AF65-F5344CB8AC3E}">
         <p14:creationId xmlns:p14="http://schemas.microsoft.com/office/powerpoint/2010/main" val="2960244171"/>
+      </p:ext>
+    </p:extLst>
+  </p:cSld>
+  <p:clrMapOvr>
+    <a:masterClrMapping/>
+  </p:clrMapOvr>
+</p:sld>
+</file>
+
+<file path=ppt/slides/slide9.xml><?xml version="1.0" encoding="utf-8"?>
+<p:sld xmlns:a="http://schemas.openxmlformats.org/drawingml/2006/main" xmlns:r="http://schemas.openxmlformats.org/officeDocument/2006/relationships" xmlns:p="http://schemas.openxmlformats.org/presentationml/2006/main">
+  <p:cSld>
+    <p:bg>
+      <p:bgPr>
+        <a:solidFill>
+          <a:schemeClr val="bg1"/>
+        </a:solidFill>
+        <a:effectLst/>
+      </p:bgPr>
+    </p:bg>
+    <p:spTree>
+      <p:nvGrpSpPr>
+        <p:cNvPr id="1" name=""/>
+        <p:cNvGrpSpPr/>
+        <p:nvPr/>
+      </p:nvGrpSpPr>
+      <p:grpSpPr>
+        <a:xfrm>
+          <a:off x="0" y="0"/>
+          <a:ext cx="0" cy="0"/>
+          <a:chOff x="0" y="0"/>
+          <a:chExt cx="0" cy="0"/>
+        </a:xfrm>
+      </p:grpSpPr>
+      <p:sp>
+        <p:nvSpPr>
+          <p:cNvPr id="11" name="Rectangle 10">
+            <a:extLst>
+              <a:ext uri="{FF2B5EF4-FFF2-40B4-BE49-F238E27FC236}">
+                <a16:creationId xmlns:a16="http://schemas.microsoft.com/office/drawing/2014/main" id="{6753252F-4873-4F63-801D-CC719279A7D5}"/>
+              </a:ext>
+              <a:ext uri="{C183D7F6-B498-43B3-948B-1728B52AA6E4}">
+                <adec:decorative xmlns:adec="http://schemas.microsoft.com/office/drawing/2017/decorative" val="1"/>
+              </a:ext>
+            </a:extLst>
+          </p:cNvPr>
+          <p:cNvSpPr>
+            <a:spLocks noGrp="1" noRot="1" noChangeAspect="1" noMove="1" noResize="1" noEditPoints="1" noAdjustHandles="1" noChangeArrowheads="1" noChangeShapeType="1" noTextEdit="1"/>
+          </p:cNvSpPr>
+          <p:nvPr>
+            <p:extLst>
+              <p:ext uri="{386F3935-93C4-4BCD-93E2-E3B085C9AB24}">
+                <p16:designElem xmlns:p16="http://schemas.microsoft.com/office/powerpoint/2015/main" val="1"/>
+              </p:ext>
+            </p:extLst>
+          </p:nvPr>
+        </p:nvSpPr>
+        <p:spPr>
+          <a:xfrm>
+            <a:off x="0" y="0"/>
+            <a:ext cx="12192000" cy="6858000"/>
+          </a:xfrm>
+          <a:prstGeom prst="rect">
+            <a:avLst/>
+          </a:prstGeom>
+          <a:solidFill>
+            <a:srgbClr val="FFFFFF"/>
+          </a:solidFill>
+          <a:ln>
+            <a:noFill/>
+          </a:ln>
+        </p:spPr>
+        <p:style>
+          <a:lnRef idx="2">
+            <a:schemeClr val="accent1">
+              <a:shade val="50000"/>
+            </a:schemeClr>
+          </a:lnRef>
+          <a:fillRef idx="1">
+            <a:schemeClr val="accent1"/>
+          </a:fillRef>
+          <a:effectRef idx="0">
+            <a:schemeClr val="accent1"/>
+          </a:effectRef>
+          <a:fontRef idx="minor">
+            <a:schemeClr val="lt1"/>
+          </a:fontRef>
+        </p:style>
+        <p:txBody>
+          <a:bodyPr rtlCol="0" anchor="ctr"/>
+          <a:lstStyle/>
+          <a:p>
+            <a:pPr algn="ctr"/>
+            <a:endParaRPr lang="en-US"/>
+          </a:p>
+        </p:txBody>
+      </p:sp>
+      <p:sp>
+        <p:nvSpPr>
+          <p:cNvPr id="13" name="Rectangle 12">
+            <a:extLst>
+              <a:ext uri="{FF2B5EF4-FFF2-40B4-BE49-F238E27FC236}">
+                <a16:creationId xmlns:a16="http://schemas.microsoft.com/office/drawing/2014/main" id="{047C8CCB-F95D-4249-92DD-651249D3535A}"/>
+              </a:ext>
+              <a:ext uri="{C183D7F6-B498-43B3-948B-1728B52AA6E4}">
+                <adec:decorative xmlns:adec="http://schemas.microsoft.com/office/drawing/2017/decorative" val="1"/>
+              </a:ext>
+            </a:extLst>
+          </p:cNvPr>
+          <p:cNvSpPr>
+            <a:spLocks noGrp="1" noRot="1" noChangeAspect="1" noMove="1" noResize="1" noEditPoints="1" noAdjustHandles="1" noChangeArrowheads="1" noChangeShapeType="1" noTextEdit="1"/>
+          </p:cNvSpPr>
+          <p:nvPr>
+            <p:extLst>
+              <p:ext uri="{386F3935-93C4-4BCD-93E2-E3B085C9AB24}">
+                <p16:designElem xmlns:p16="http://schemas.microsoft.com/office/powerpoint/2015/main" val="1"/>
+              </p:ext>
+            </p:extLst>
+          </p:nvPr>
+        </p:nvSpPr>
+        <p:spPr>
+          <a:xfrm>
+            <a:off x="0" y="0"/>
+            <a:ext cx="2013557" cy="6858000"/>
+          </a:xfrm>
+          <a:prstGeom prst="rect">
+            <a:avLst/>
+          </a:prstGeom>
+          <a:solidFill>
+            <a:srgbClr val="614B42"/>
+          </a:solidFill>
+          <a:ln>
+            <a:noFill/>
+          </a:ln>
+        </p:spPr>
+        <p:style>
+          <a:lnRef idx="2">
+            <a:schemeClr val="accent1">
+              <a:shade val="50000"/>
+            </a:schemeClr>
+          </a:lnRef>
+          <a:fillRef idx="1">
+            <a:schemeClr val="accent1"/>
+          </a:fillRef>
+          <a:effectRef idx="0">
+            <a:schemeClr val="accent1"/>
+          </a:effectRef>
+          <a:fontRef idx="minor">
+            <a:schemeClr val="lt1"/>
+          </a:fontRef>
+        </p:style>
+        <p:txBody>
+          <a:bodyPr rtlCol="0" anchor="ctr"/>
+          <a:lstStyle/>
+          <a:p>
+            <a:pPr algn="ctr"/>
+            <a:endParaRPr lang="en-US"/>
+          </a:p>
+        </p:txBody>
+      </p:sp>
+      <p:sp>
+        <p:nvSpPr>
+          <p:cNvPr id="2" name="Title 1">
+            <a:extLst>
+              <a:ext uri="{FF2B5EF4-FFF2-40B4-BE49-F238E27FC236}">
+                <a16:creationId xmlns:a16="http://schemas.microsoft.com/office/drawing/2014/main" id="{EE3C5590-FA72-4F58-ABDF-3685C9C7DAAA}"/>
+              </a:ext>
+            </a:extLst>
+          </p:cNvPr>
+          <p:cNvSpPr>
+            <a:spLocks noGrp="1"/>
+          </p:cNvSpPr>
+          <p:nvPr>
+            <p:ph type="title"/>
+          </p:nvPr>
+        </p:nvSpPr>
+        <p:spPr>
+          <a:xfrm>
+            <a:off x="200629" y="1900743"/>
+            <a:ext cx="2752354" cy="2709275"/>
+          </a:xfrm>
+          <a:prstGeom prst="ellipse">
+            <a:avLst/>
+          </a:prstGeom>
+          <a:solidFill>
+            <a:srgbClr val="262626"/>
+          </a:solidFill>
+          <a:ln w="174625" cmpd="thinThick">
+            <a:solidFill>
+              <a:srgbClr val="262626"/>
+            </a:solidFill>
+          </a:ln>
+        </p:spPr>
+        <p:txBody>
+          <a:bodyPr vert="horz" lIns="91440" tIns="45720" rIns="91440" bIns="45720" rtlCol="0" anchor="ctr">
+            <a:normAutofit/>
+          </a:bodyPr>
+          <a:lstStyle/>
+          <a:p>
+            <a:pPr algn="ctr"/>
+            <a:r>
+              <a:rPr lang="en-US" sz="2600" kern="1200">
+                <a:solidFill>
+                  <a:srgbClr val="FFFFFF"/>
+                </a:solidFill>
+                <a:latin typeface="+mj-lt"/>
+                <a:ea typeface="+mj-ea"/>
+                <a:cs typeface="+mj-cs"/>
+              </a:rPr>
+              <a:t>React’s Way</a:t>
+            </a:r>
+          </a:p>
+        </p:txBody>
+      </p:sp>
+      <p:pic>
+        <p:nvPicPr>
+          <p:cNvPr id="6" name="Content Placeholder 5">
+            <a:extLst>
+              <a:ext uri="{FF2B5EF4-FFF2-40B4-BE49-F238E27FC236}">
+                <a16:creationId xmlns:a16="http://schemas.microsoft.com/office/drawing/2014/main" id="{570980D7-2D32-45D6-BA72-312BE6F561CC}"/>
+              </a:ext>
+            </a:extLst>
+          </p:cNvPr>
+          <p:cNvPicPr>
+            <a:picLocks noGrp="1" noChangeAspect="1"/>
+          </p:cNvPicPr>
+          <p:nvPr>
+            <p:ph idx="1"/>
+          </p:nvPr>
+        </p:nvPicPr>
+        <p:blipFill>
+          <a:blip r:embed="rId2">
+            <a:extLst>
+              <a:ext uri="{28A0092B-C50C-407E-A947-70E740481C1C}">
+                <a14:useLocalDpi xmlns:a14="http://schemas.microsoft.com/office/drawing/2010/main" val="0"/>
+              </a:ext>
+            </a:extLst>
+          </a:blip>
+          <a:stretch>
+            <a:fillRect/>
+          </a:stretch>
+        </p:blipFill>
+        <p:spPr>
+          <a:xfrm>
+            <a:off x="4038600" y="1459536"/>
+            <a:ext cx="7188199" cy="3935538"/>
+          </a:xfrm>
+          <a:prstGeom prst="rect">
+            <a:avLst/>
+          </a:prstGeom>
+        </p:spPr>
+      </p:pic>
+    </p:spTree>
+    <p:extLst>
+      <p:ext uri="{BB962C8B-B14F-4D97-AF65-F5344CB8AC3E}">
+        <p14:creationId xmlns:p14="http://schemas.microsoft.com/office/powerpoint/2010/main" val="3463946540"/>
       </p:ext>
     </p:extLst>
   </p:cSld>

</xml_diff>

<commit_message>
finishing some links on the readm.md as well the the PowerPoint slides
</commit_message>
<xml_diff>
--- a/PowerPoint/React.pptx
+++ b/PowerPoint/React.pptx
@@ -10,13 +10,14 @@
     <p:sldId id="262" r:id="rId4"/>
     <p:sldId id="258" r:id="rId5"/>
     <p:sldId id="259" r:id="rId6"/>
-    <p:sldId id="260" r:id="rId7"/>
-    <p:sldId id="261" r:id="rId8"/>
-    <p:sldId id="264" r:id="rId9"/>
-    <p:sldId id="265" r:id="rId10"/>
-    <p:sldId id="267" r:id="rId11"/>
+    <p:sldId id="261" r:id="rId7"/>
+    <p:sldId id="270" r:id="rId8"/>
+    <p:sldId id="265" r:id="rId9"/>
+    <p:sldId id="267" r:id="rId10"/>
+    <p:sldId id="271" r:id="rId11"/>
     <p:sldId id="268" r:id="rId12"/>
-    <p:sldId id="269" r:id="rId13"/>
+    <p:sldId id="272" r:id="rId13"/>
+    <p:sldId id="269" r:id="rId14"/>
   </p:sldIdLst>
   <p:sldSz cx="12192000" cy="6858000"/>
   <p:notesSz cx="6858000" cy="9144000"/>
@@ -125,16 +126,17 @@
             <p14:sldId id="262"/>
             <p14:sldId id="258"/>
             <p14:sldId id="259"/>
-            <p14:sldId id="260"/>
             <p14:sldId id="261"/>
+            <p14:sldId id="270"/>
           </p14:sldIdLst>
         </p14:section>
         <p14:section name="Default Section" id="{B59B3F2F-A5EE-41F1-9EA0-A2519934DF4F}">
           <p14:sldIdLst>
-            <p14:sldId id="264"/>
             <p14:sldId id="265"/>
             <p14:sldId id="267"/>
+            <p14:sldId id="271"/>
             <p14:sldId id="268"/>
+            <p14:sldId id="272"/>
             <p14:sldId id="269"/>
           </p14:sldIdLst>
         </p14:section>
@@ -294,7 +296,7 @@
           <a:p>
             <a:fld id="{4A105A33-B027-4A7D-BC88-BF07D2F361B2}" type="datetimeFigureOut">
               <a:rPr lang="en-US" smtClean="0"/>
-              <a:t>9/14/2018</a:t>
+              <a:t>9/17/2018</a:t>
             </a:fld>
             <a:endParaRPr lang="en-US"/>
           </a:p>
@@ -492,7 +494,7 @@
           <a:p>
             <a:fld id="{4A105A33-B027-4A7D-BC88-BF07D2F361B2}" type="datetimeFigureOut">
               <a:rPr lang="en-US" smtClean="0"/>
-              <a:t>9/14/2018</a:t>
+              <a:t>9/17/2018</a:t>
             </a:fld>
             <a:endParaRPr lang="en-US"/>
           </a:p>
@@ -700,7 +702,7 @@
           <a:p>
             <a:fld id="{4A105A33-B027-4A7D-BC88-BF07D2F361B2}" type="datetimeFigureOut">
               <a:rPr lang="en-US" smtClean="0"/>
-              <a:t>9/14/2018</a:t>
+              <a:t>9/17/2018</a:t>
             </a:fld>
             <a:endParaRPr lang="en-US"/>
           </a:p>
@@ -898,7 +900,7 @@
           <a:p>
             <a:fld id="{4A105A33-B027-4A7D-BC88-BF07D2F361B2}" type="datetimeFigureOut">
               <a:rPr lang="en-US" smtClean="0"/>
-              <a:t>9/14/2018</a:t>
+              <a:t>9/17/2018</a:t>
             </a:fld>
             <a:endParaRPr lang="en-US"/>
           </a:p>
@@ -1173,7 +1175,7 @@
           <a:p>
             <a:fld id="{4A105A33-B027-4A7D-BC88-BF07D2F361B2}" type="datetimeFigureOut">
               <a:rPr lang="en-US" smtClean="0"/>
-              <a:t>9/14/2018</a:t>
+              <a:t>9/17/2018</a:t>
             </a:fld>
             <a:endParaRPr lang="en-US"/>
           </a:p>
@@ -1438,7 +1440,7 @@
           <a:p>
             <a:fld id="{4A105A33-B027-4A7D-BC88-BF07D2F361B2}" type="datetimeFigureOut">
               <a:rPr lang="en-US" smtClean="0"/>
-              <a:t>9/14/2018</a:t>
+              <a:t>9/17/2018</a:t>
             </a:fld>
             <a:endParaRPr lang="en-US"/>
           </a:p>
@@ -1850,7 +1852,7 @@
           <a:p>
             <a:fld id="{4A105A33-B027-4A7D-BC88-BF07D2F361B2}" type="datetimeFigureOut">
               <a:rPr lang="en-US" smtClean="0"/>
-              <a:t>9/14/2018</a:t>
+              <a:t>9/17/2018</a:t>
             </a:fld>
             <a:endParaRPr lang="en-US"/>
           </a:p>
@@ -1991,7 +1993,7 @@
           <a:p>
             <a:fld id="{4A105A33-B027-4A7D-BC88-BF07D2F361B2}" type="datetimeFigureOut">
               <a:rPr lang="en-US" smtClean="0"/>
-              <a:t>9/14/2018</a:t>
+              <a:t>9/17/2018</a:t>
             </a:fld>
             <a:endParaRPr lang="en-US"/>
           </a:p>
@@ -2104,7 +2106,7 @@
           <a:p>
             <a:fld id="{4A105A33-B027-4A7D-BC88-BF07D2F361B2}" type="datetimeFigureOut">
               <a:rPr lang="en-US" smtClean="0"/>
-              <a:t>9/14/2018</a:t>
+              <a:t>9/17/2018</a:t>
             </a:fld>
             <a:endParaRPr lang="en-US"/>
           </a:p>
@@ -2415,7 +2417,7 @@
           <a:p>
             <a:fld id="{4A105A33-B027-4A7D-BC88-BF07D2F361B2}" type="datetimeFigureOut">
               <a:rPr lang="en-US" smtClean="0"/>
-              <a:t>9/14/2018</a:t>
+              <a:t>9/17/2018</a:t>
             </a:fld>
             <a:endParaRPr lang="en-US"/>
           </a:p>
@@ -2703,7 +2705,7 @@
           <a:p>
             <a:fld id="{4A105A33-B027-4A7D-BC88-BF07D2F361B2}" type="datetimeFigureOut">
               <a:rPr lang="en-US" smtClean="0"/>
-              <a:t>9/14/2018</a:t>
+              <a:t>9/17/2018</a:t>
             </a:fld>
             <a:endParaRPr lang="en-US"/>
           </a:p>
@@ -2944,7 +2946,7 @@
           <a:p>
             <a:fld id="{4A105A33-B027-4A7D-BC88-BF07D2F361B2}" type="datetimeFigureOut">
               <a:rPr lang="en-US" smtClean="0"/>
-              <a:t>9/14/2018</a:t>
+              <a:t>9/17/2018</a:t>
             </a:fld>
             <a:endParaRPr lang="en-US"/>
           </a:p>
@@ -3462,118 +3464,79 @@
       </p:grpSpPr>
       <p:sp>
         <p:nvSpPr>
-          <p:cNvPr id="2" name="Title 1">
-            <a:extLst>
-              <a:ext uri="{FF2B5EF4-FFF2-40B4-BE49-F238E27FC236}">
-                <a16:creationId xmlns:a16="http://schemas.microsoft.com/office/drawing/2014/main" id="{C6ADBBF2-F034-4560-AB9F-2EFC5AAC6339}"/>
-              </a:ext>
-            </a:extLst>
-          </p:cNvPr>
-          <p:cNvSpPr>
-            <a:spLocks noGrp="1"/>
-          </p:cNvSpPr>
-          <p:nvPr>
-            <p:ph type="title"/>
+          <p:cNvPr id="3" name="Text Placeholder 2">
+            <a:extLst>
+              <a:ext uri="{FF2B5EF4-FFF2-40B4-BE49-F238E27FC236}">
+                <a16:creationId xmlns:a16="http://schemas.microsoft.com/office/drawing/2014/main" id="{AF362DEB-81F8-427D-8199-5955F40AE324}"/>
+              </a:ext>
+            </a:extLst>
+          </p:cNvPr>
+          <p:cNvSpPr>
+            <a:spLocks noGrp="1"/>
+          </p:cNvSpPr>
+          <p:nvPr>
+            <p:ph type="body" idx="1"/>
           </p:nvPr>
         </p:nvSpPr>
         <p:spPr>
           <a:xfrm>
-            <a:off x="839788" y="365125"/>
-            <a:ext cx="10515600" cy="644525"/>
+            <a:off x="368820" y="256381"/>
+            <a:ext cx="5157786" cy="823912"/>
           </a:xfrm>
         </p:spPr>
         <p:txBody>
-          <a:bodyPr>
-            <a:normAutofit fontScale="90000"/>
-          </a:bodyPr>
+          <a:bodyPr/>
           <a:lstStyle/>
           <a:p>
             <a:pPr algn="ctr"/>
             <a:r>
               <a:rPr lang="en-US" dirty="0"/>
-              <a:t>Uncontrolled and Controlled components.</a:t>
-            </a:r>
-            <a:br>
-              <a:rPr lang="en-US" dirty="0"/>
-            </a:br>
-            <a:endParaRPr lang="en-US" dirty="0"/>
-          </a:p>
-        </p:txBody>
-      </p:sp>
-      <p:sp>
-        <p:nvSpPr>
-          <p:cNvPr id="3" name="Text Placeholder 2">
-            <a:extLst>
-              <a:ext uri="{FF2B5EF4-FFF2-40B4-BE49-F238E27FC236}">
-                <a16:creationId xmlns:a16="http://schemas.microsoft.com/office/drawing/2014/main" id="{736C2F82-34A4-40D8-8FF6-D474CE3E4DAD}"/>
-              </a:ext>
-            </a:extLst>
-          </p:cNvPr>
-          <p:cNvSpPr>
-            <a:spLocks noGrp="1"/>
-          </p:cNvSpPr>
-          <p:nvPr>
-            <p:ph type="body" idx="1"/>
-          </p:nvPr>
-        </p:nvSpPr>
+              <a:t>? Component</a:t>
+            </a:r>
+          </a:p>
+        </p:txBody>
+      </p:sp>
+      <p:pic>
+        <p:nvPicPr>
+          <p:cNvPr id="8" name="Content Placeholder 7">
+            <a:extLst>
+              <a:ext uri="{FF2B5EF4-FFF2-40B4-BE49-F238E27FC236}">
+                <a16:creationId xmlns:a16="http://schemas.microsoft.com/office/drawing/2014/main" id="{36DAE62C-9E7A-493B-A19B-B161BC00A507}"/>
+              </a:ext>
+            </a:extLst>
+          </p:cNvPr>
+          <p:cNvPicPr>
+            <a:picLocks noGrp="1" noChangeAspect="1"/>
+          </p:cNvPicPr>
+          <p:nvPr>
+            <p:ph sz="half" idx="2"/>
+          </p:nvPr>
+        </p:nvPicPr>
+        <p:blipFill>
+          <a:blip r:embed="rId2">
+            <a:extLst>
+              <a:ext uri="{28A0092B-C50C-407E-A947-70E740481C1C}">
+                <a14:useLocalDpi xmlns:a14="http://schemas.microsoft.com/office/drawing/2010/main" val="0"/>
+              </a:ext>
+            </a:extLst>
+          </a:blip>
+          <a:stretch>
+            <a:fillRect/>
+          </a:stretch>
+        </p:blipFill>
         <p:spPr>
           <a:xfrm>
-            <a:off x="839788" y="1690688"/>
-            <a:ext cx="5157787" cy="823912"/>
+            <a:off x="368819" y="1219200"/>
+            <a:ext cx="5157786" cy="4970463"/>
           </a:xfrm>
         </p:spPr>
-        <p:txBody>
-          <a:bodyPr/>
-          <a:lstStyle/>
-          <a:p>
-            <a:pPr algn="ctr"/>
-            <a:r>
-              <a:rPr lang="en-US" dirty="0"/>
-              <a:t>Controlled</a:t>
-            </a:r>
-          </a:p>
-        </p:txBody>
-      </p:sp>
-      <p:sp>
-        <p:nvSpPr>
-          <p:cNvPr id="4" name="Content Placeholder 3">
-            <a:extLst>
-              <a:ext uri="{FF2B5EF4-FFF2-40B4-BE49-F238E27FC236}">
-                <a16:creationId xmlns:a16="http://schemas.microsoft.com/office/drawing/2014/main" id="{3B146C61-EEB7-4965-91B5-C4927FF00604}"/>
-              </a:ext>
-            </a:extLst>
-          </p:cNvPr>
-          <p:cNvSpPr>
-            <a:spLocks noGrp="1"/>
-          </p:cNvSpPr>
-          <p:nvPr>
-            <p:ph sz="half" idx="2"/>
-          </p:nvPr>
-        </p:nvSpPr>
-        <p:spPr/>
-        <p:txBody>
-          <a:bodyPr/>
-          <a:lstStyle/>
-          <a:p>
-            <a:r>
-              <a:rPr lang="en-US" dirty="0"/>
-              <a:t>You specify the value of the input with a state variable, every time a user enters a value, the state is updated via a function call.</a:t>
-            </a:r>
-          </a:p>
-          <a:p>
-            <a:r>
-              <a:rPr lang="en-US" dirty="0"/>
-              <a:t>Uses the virtual DOM.</a:t>
-            </a:r>
-          </a:p>
-        </p:txBody>
-      </p:sp>
+      </p:pic>
       <p:sp>
         <p:nvSpPr>
           <p:cNvPr id="5" name="Text Placeholder 4">
             <a:extLst>
               <a:ext uri="{FF2B5EF4-FFF2-40B4-BE49-F238E27FC236}">
-                <a16:creationId xmlns:a16="http://schemas.microsoft.com/office/drawing/2014/main" id="{91A94C35-8667-4899-BC73-0A29D7B29325}"/>
+                <a16:creationId xmlns:a16="http://schemas.microsoft.com/office/drawing/2014/main" id="{36109112-0CF5-4611-84E2-B51F4BF9B22C}"/>
               </a:ext>
             </a:extLst>
           </p:cNvPr>
@@ -3586,8 +3549,8 @@
         </p:nvSpPr>
         <p:spPr>
           <a:xfrm>
-            <a:off x="6172200" y="1681163"/>
-            <a:ext cx="5183188" cy="823912"/>
+            <a:off x="5826368" y="256381"/>
+            <a:ext cx="5529020" cy="823912"/>
           </a:xfrm>
         </p:spPr>
         <p:txBody>
@@ -3597,87 +3560,50 @@
             <a:pPr algn="ctr"/>
             <a:r>
               <a:rPr lang="en-US" dirty="0"/>
-              <a:t>Uncontrolled</a:t>
-            </a:r>
-          </a:p>
-        </p:txBody>
-      </p:sp>
-      <p:sp>
-        <p:nvSpPr>
-          <p:cNvPr id="6" name="Content Placeholder 5">
-            <a:extLst>
-              <a:ext uri="{FF2B5EF4-FFF2-40B4-BE49-F238E27FC236}">
-                <a16:creationId xmlns:a16="http://schemas.microsoft.com/office/drawing/2014/main" id="{9AE9532C-1224-457B-ADD1-B084F508DE32}"/>
-              </a:ext>
-            </a:extLst>
-          </p:cNvPr>
-          <p:cNvSpPr>
-            <a:spLocks noGrp="1"/>
-          </p:cNvSpPr>
+              <a:t>? Component</a:t>
+            </a:r>
+          </a:p>
+        </p:txBody>
+      </p:sp>
+      <p:pic>
+        <p:nvPicPr>
+          <p:cNvPr id="10" name="Content Placeholder 9">
+            <a:extLst>
+              <a:ext uri="{FF2B5EF4-FFF2-40B4-BE49-F238E27FC236}">
+                <a16:creationId xmlns:a16="http://schemas.microsoft.com/office/drawing/2014/main" id="{E653D7F6-9B86-4F43-A24A-6CEFD3794DAD}"/>
+              </a:ext>
+            </a:extLst>
+          </p:cNvPr>
+          <p:cNvPicPr>
+            <a:picLocks noGrp="1" noChangeAspect="1"/>
+          </p:cNvPicPr>
           <p:nvPr>
             <p:ph sz="quarter" idx="4"/>
           </p:nvPr>
-        </p:nvSpPr>
-        <p:spPr/>
-        <p:txBody>
-          <a:bodyPr/>
-          <a:lstStyle/>
-          <a:p>
-            <a:r>
-              <a:rPr lang="en-US" dirty="0"/>
-              <a:t>Uses the DOM.</a:t>
-            </a:r>
-          </a:p>
-          <a:p>
-            <a:r>
-              <a:rPr lang="en-US" dirty="0"/>
-              <a:t>Binds to DOM elements using the Ref keyword, or using a event object.</a:t>
-            </a:r>
-          </a:p>
-          <a:p>
-            <a:endParaRPr lang="en-US" dirty="0"/>
-          </a:p>
-        </p:txBody>
-      </p:sp>
-      <p:sp>
-        <p:nvSpPr>
-          <p:cNvPr id="7" name="TextBox 6">
-            <a:extLst>
-              <a:ext uri="{FF2B5EF4-FFF2-40B4-BE49-F238E27FC236}">
-                <a16:creationId xmlns:a16="http://schemas.microsoft.com/office/drawing/2014/main" id="{11B02B32-1951-4C07-93AD-317C7BC2D32E}"/>
-              </a:ext>
-            </a:extLst>
-          </p:cNvPr>
-          <p:cNvSpPr txBox="1"/>
-          <p:nvPr/>
-        </p:nvSpPr>
+        </p:nvPicPr>
+        <p:blipFill>
+          <a:blip r:embed="rId3">
+            <a:extLst>
+              <a:ext uri="{28A0092B-C50C-407E-A947-70E740481C1C}">
+                <a14:useLocalDpi xmlns:a14="http://schemas.microsoft.com/office/drawing/2010/main" val="0"/>
+              </a:ext>
+            </a:extLst>
+          </a:blip>
+          <a:stretch>
+            <a:fillRect/>
+          </a:stretch>
+        </p:blipFill>
         <p:spPr>
           <a:xfrm>
-            <a:off x="2972594" y="1084541"/>
-            <a:ext cx="6246812" cy="369332"/>
+            <a:off x="5826368" y="1219199"/>
+            <a:ext cx="5529019" cy="4970463"/>
           </a:xfrm>
-          <a:prstGeom prst="rect">
-            <a:avLst/>
-          </a:prstGeom>
-          <a:noFill/>
         </p:spPr>
-        <p:txBody>
-          <a:bodyPr wrap="square" rtlCol="0">
-            <a:spAutoFit/>
-          </a:bodyPr>
-          <a:lstStyle/>
-          <a:p>
-            <a:r>
-              <a:rPr lang="en-US" dirty="0"/>
-              <a:t>Describes the method of obtaining input data from HTML inputs.</a:t>
-            </a:r>
-          </a:p>
-        </p:txBody>
-      </p:sp>
+      </p:pic>
     </p:spTree>
     <p:extLst>
       <p:ext uri="{BB962C8B-B14F-4D97-AF65-F5344CB8AC3E}">
-        <p14:creationId xmlns:p14="http://schemas.microsoft.com/office/powerpoint/2010/main" val="3796533581"/>
+        <p14:creationId xmlns:p14="http://schemas.microsoft.com/office/powerpoint/2010/main" val="2751953980"/>
       </p:ext>
     </p:extLst>
   </p:cSld>
@@ -3736,19 +3662,19 @@
           <a:p>
             <a:r>
               <a:rPr lang="en-US" dirty="0"/>
-              <a:t>Component is a class.</a:t>
+              <a:t>Component is a class</a:t>
             </a:r>
           </a:p>
           <a:p>
             <a:r>
               <a:rPr lang="en-US" dirty="0"/>
-              <a:t>Has access to state/props, and to the React component life cycle.</a:t>
+              <a:t>Has access to state/props, and to the React component life cycle</a:t>
             </a:r>
           </a:p>
           <a:p>
             <a:r>
               <a:rPr lang="en-US" dirty="0"/>
-              <a:t>I have included links in the README.md to some resources on component life cycle.</a:t>
+              <a:t>I have included links in the README.md to some resources on component life cycle</a:t>
             </a:r>
           </a:p>
         </p:txBody>
@@ -3785,19 +3711,19 @@
           <a:p>
             <a:r>
               <a:rPr lang="en-US" dirty="0"/>
-              <a:t>Component is a function, that takes props as a parameter.</a:t>
+              <a:t>Component is a function, that takes props as a parameter</a:t>
             </a:r>
           </a:p>
           <a:p>
             <a:r>
               <a:rPr lang="en-US" dirty="0"/>
-              <a:t>Can only receive props.</a:t>
+              <a:t>Can only receive props</a:t>
             </a:r>
           </a:p>
           <a:p>
             <a:r>
               <a:rPr lang="en-US" dirty="0"/>
-              <a:t>Can’t store state locally.</a:t>
+              <a:t>Can’t store state locally</a:t>
             </a:r>
           </a:p>
           <a:p>
@@ -3879,6 +3805,107 @@
           <p:cNvPr id="2" name="Title 1">
             <a:extLst>
               <a:ext uri="{FF2B5EF4-FFF2-40B4-BE49-F238E27FC236}">
+                <a16:creationId xmlns:a16="http://schemas.microsoft.com/office/drawing/2014/main" id="{09D0AFAA-C22E-4BA8-A4EF-BAE421C88538}"/>
+              </a:ext>
+            </a:extLst>
+          </p:cNvPr>
+          <p:cNvSpPr>
+            <a:spLocks noGrp="1"/>
+          </p:cNvSpPr>
+          <p:nvPr>
+            <p:ph type="title"/>
+          </p:nvPr>
+        </p:nvSpPr>
+        <p:spPr>
+          <a:xfrm>
+            <a:off x="838200" y="365125"/>
+            <a:ext cx="10515600" cy="655601"/>
+          </a:xfrm>
+        </p:spPr>
+        <p:txBody>
+          <a:bodyPr>
+            <a:normAutofit fontScale="90000"/>
+          </a:bodyPr>
+          <a:lstStyle/>
+          <a:p>
+            <a:pPr algn="ctr"/>
+            <a:r>
+              <a:rPr lang="en-US" dirty="0"/>
+              <a:t>Functional Component</a:t>
+            </a:r>
+          </a:p>
+        </p:txBody>
+      </p:sp>
+      <p:pic>
+        <p:nvPicPr>
+          <p:cNvPr id="9" name="Content Placeholder 8">
+            <a:extLst>
+              <a:ext uri="{FF2B5EF4-FFF2-40B4-BE49-F238E27FC236}">
+                <a16:creationId xmlns:a16="http://schemas.microsoft.com/office/drawing/2014/main" id="{F2A3CC6F-F9DF-4AEF-8A0C-9F03FDA1ABA3}"/>
+              </a:ext>
+            </a:extLst>
+          </p:cNvPr>
+          <p:cNvPicPr>
+            <a:picLocks noGrp="1" noChangeAspect="1"/>
+          </p:cNvPicPr>
+          <p:nvPr>
+            <p:ph sz="half" idx="2"/>
+          </p:nvPr>
+        </p:nvPicPr>
+        <p:blipFill>
+          <a:blip r:embed="rId2">
+            <a:extLst>
+              <a:ext uri="{28A0092B-C50C-407E-A947-70E740481C1C}">
+                <a14:useLocalDpi xmlns:a14="http://schemas.microsoft.com/office/drawing/2010/main" val="0"/>
+              </a:ext>
+            </a:extLst>
+          </a:blip>
+          <a:stretch>
+            <a:fillRect/>
+          </a:stretch>
+        </p:blipFill>
+        <p:spPr>
+          <a:xfrm>
+            <a:off x="2619153" y="1329071"/>
+            <a:ext cx="6953693" cy="4746136"/>
+          </a:xfrm>
+        </p:spPr>
+      </p:pic>
+    </p:spTree>
+    <p:extLst>
+      <p:ext uri="{BB962C8B-B14F-4D97-AF65-F5344CB8AC3E}">
+        <p14:creationId xmlns:p14="http://schemas.microsoft.com/office/powerpoint/2010/main" val="468624891"/>
+      </p:ext>
+    </p:extLst>
+  </p:cSld>
+  <p:clrMapOvr>
+    <a:masterClrMapping/>
+  </p:clrMapOvr>
+</p:sld>
+</file>
+
+<file path=ppt/slides/slide13.xml><?xml version="1.0" encoding="utf-8"?>
+<p:sld xmlns:a="http://schemas.openxmlformats.org/drawingml/2006/main" xmlns:r="http://schemas.openxmlformats.org/officeDocument/2006/relationships" xmlns:p="http://schemas.openxmlformats.org/presentationml/2006/main">
+  <p:cSld>
+    <p:spTree>
+      <p:nvGrpSpPr>
+        <p:cNvPr id="1" name=""/>
+        <p:cNvGrpSpPr/>
+        <p:nvPr/>
+      </p:nvGrpSpPr>
+      <p:grpSpPr>
+        <a:xfrm>
+          <a:off x="0" y="0"/>
+          <a:ext cx="0" cy="0"/>
+          <a:chOff x="0" y="0"/>
+          <a:chExt cx="0" cy="0"/>
+        </a:xfrm>
+      </p:grpSpPr>
+      <p:sp>
+        <p:nvSpPr>
+          <p:cNvPr id="2" name="Title 1">
+            <a:extLst>
+              <a:ext uri="{FF2B5EF4-FFF2-40B4-BE49-F238E27FC236}">
                 <a16:creationId xmlns:a16="http://schemas.microsoft.com/office/drawing/2014/main" id="{A93B7861-4A81-4725-A7F3-1680C480A4E4}"/>
               </a:ext>
             </a:extLst>
@@ -3955,13 +3982,13 @@
           <a:p>
             <a:r>
               <a:rPr lang="en-US" dirty="0"/>
-              <a:t>State lives locally/internally on a class component.</a:t>
+              <a:t>State lives locally/internally on a class component</a:t>
             </a:r>
           </a:p>
           <a:p>
             <a:r>
               <a:rPr lang="en-US" dirty="0"/>
-              <a:t>State has memory, State can be updated or changed.</a:t>
+              <a:t>State has memory, State can be updated or changed</a:t>
             </a:r>
           </a:p>
           <a:p>
@@ -4024,19 +4051,19 @@
           <a:p>
             <a:r>
               <a:rPr lang="en-US" dirty="0"/>
-              <a:t>Props are values, passed down from a parent component. </a:t>
+              <a:t>Props are values, passed down from a parent component </a:t>
             </a:r>
           </a:p>
           <a:p>
             <a:r>
               <a:rPr lang="en-US" dirty="0"/>
-              <a:t>Props cannot be changed directly, or updated.</a:t>
+              <a:t>Props cannot be changed directly, or updated</a:t>
             </a:r>
           </a:p>
           <a:p>
             <a:r>
               <a:rPr lang="en-US" dirty="0"/>
-              <a:t>Props are mainly used on Functional/Pure components.</a:t>
+              <a:t>Props are mainly used on Functional/Pure components</a:t>
             </a:r>
           </a:p>
         </p:txBody>
@@ -5079,6 +5106,14 @@
 <file path=ppt/slides/slide6.xml><?xml version="1.0" encoding="utf-8"?>
 <p:sld xmlns:a="http://schemas.openxmlformats.org/drawingml/2006/main" xmlns:r="http://schemas.openxmlformats.org/officeDocument/2006/relationships" xmlns:p="http://schemas.openxmlformats.org/presentationml/2006/main">
   <p:cSld>
+    <p:bg>
+      <p:bgPr>
+        <a:solidFill>
+          <a:schemeClr val="bg1"/>
+        </a:solidFill>
+        <a:effectLst/>
+      </p:bgPr>
+    </p:bg>
     <p:spTree>
       <p:nvGrpSpPr>
         <p:cNvPr id="1" name=""/>
@@ -5095,116 +5130,73 @@
       </p:grpSpPr>
       <p:sp>
         <p:nvSpPr>
-          <p:cNvPr id="2" name="Title 1">
-            <a:extLst>
-              <a:ext uri="{FF2B5EF4-FFF2-40B4-BE49-F238E27FC236}">
-                <a16:creationId xmlns:a16="http://schemas.microsoft.com/office/drawing/2014/main" id="{3200517C-5B63-4613-B093-FFCEE3C3D0F2}"/>
-              </a:ext>
-            </a:extLst>
-          </p:cNvPr>
-          <p:cNvSpPr>
-            <a:spLocks noGrp="1"/>
-          </p:cNvSpPr>
-          <p:nvPr>
-            <p:ph type="title"/>
-          </p:nvPr>
-        </p:nvSpPr>
-        <p:spPr/>
-        <p:txBody>
-          <a:bodyPr/>
-          <a:lstStyle/>
-          <a:p>
-            <a:r>
-              <a:rPr lang="en-US" dirty="0"/>
-              <a:t>Why should you care?</a:t>
-            </a:r>
-          </a:p>
-        </p:txBody>
-      </p:sp>
-      <p:sp>
-        <p:nvSpPr>
-          <p:cNvPr id="3" name="Content Placeholder 2">
-            <a:extLst>
-              <a:ext uri="{FF2B5EF4-FFF2-40B4-BE49-F238E27FC236}">
-                <a16:creationId xmlns:a16="http://schemas.microsoft.com/office/drawing/2014/main" id="{B6932EB8-C7A5-470B-BF15-CB60B06DB232}"/>
-              </a:ext>
-            </a:extLst>
-          </p:cNvPr>
-          <p:cNvSpPr>
-            <a:spLocks noGrp="1"/>
-          </p:cNvSpPr>
-          <p:nvPr>
-            <p:ph idx="1"/>
+          <p:cNvPr id="10" name="Rectangle 9">
+            <a:extLst>
+              <a:ext uri="{FF2B5EF4-FFF2-40B4-BE49-F238E27FC236}">
+                <a16:creationId xmlns:a16="http://schemas.microsoft.com/office/drawing/2014/main" id="{C5E6CFF1-2F42-4E10-9A97-F116F46F53FE}"/>
+              </a:ext>
+              <a:ext uri="{C183D7F6-B498-43B3-948B-1728B52AA6E4}">
+                <adec:decorative xmlns:adec="http://schemas.microsoft.com/office/drawing/2017/decorative" val="1"/>
+              </a:ext>
+            </a:extLst>
+          </p:cNvPr>
+          <p:cNvSpPr>
+            <a:spLocks noGrp="1" noRot="1" noChangeAspect="1" noMove="1" noResize="1" noEditPoints="1" noAdjustHandles="1" noChangeArrowheads="1" noChangeShapeType="1" noTextEdit="1"/>
+          </p:cNvSpPr>
+          <p:nvPr>
+            <p:extLst>
+              <p:ext uri="{386F3935-93C4-4BCD-93E2-E3B085C9AB24}">
+                <p16:designElem xmlns:p16="http://schemas.microsoft.com/office/powerpoint/2015/main" val="1"/>
+              </p:ext>
+            </p:extLst>
           </p:nvPr>
         </p:nvSpPr>
         <p:spPr>
           <a:xfrm>
-            <a:off x="838200" y="1825625"/>
-            <a:ext cx="3970468" cy="541057"/>
-          </a:xfrm>
-        </p:spPr>
-        <p:txBody>
-          <a:bodyPr/>
-          <a:lstStyle/>
-          <a:p>
-            <a:r>
-              <a:rPr lang="en-US" dirty="0"/>
-              <a:t>High performance DOM</a:t>
-            </a:r>
-          </a:p>
-        </p:txBody>
-      </p:sp>
-      <p:sp>
-        <p:nvSpPr>
-          <p:cNvPr id="4" name="AutoShape 2" descr="Image result for react dom">
-            <a:extLst>
-              <a:ext uri="{FF2B5EF4-FFF2-40B4-BE49-F238E27FC236}">
-                <a16:creationId xmlns:a16="http://schemas.microsoft.com/office/drawing/2014/main" id="{D06FE6D5-04BD-45AA-844D-058FF4C14611}"/>
-              </a:ext>
-            </a:extLst>
-          </p:cNvPr>
-          <p:cNvSpPr>
-            <a:spLocks noChangeAspect="1" noChangeArrowheads="1"/>
-          </p:cNvSpPr>
-          <p:nvPr/>
-        </p:nvSpPr>
-        <p:spPr bwMode="auto">
-          <a:xfrm>
-            <a:off x="3057525" y="1147763"/>
-            <a:ext cx="6076950" cy="4562475"/>
+            <a:off x="0" y="0"/>
+            <a:ext cx="12192000" cy="6858000"/>
           </a:xfrm>
           <a:prstGeom prst="rect">
             <a:avLst/>
           </a:prstGeom>
-          <a:noFill/>
-          <a:extLst>
-            <a:ext uri="{909E8E84-426E-40DD-AFC4-6F175D3DCCD1}">
-              <a14:hiddenFill xmlns:a14="http://schemas.microsoft.com/office/drawing/2010/main">
-                <a:solidFill>
-                  <a:srgbClr val="FFFFFF"/>
-                </a:solidFill>
-              </a14:hiddenFill>
-            </a:ext>
-          </a:extLst>
+          <a:solidFill>
+            <a:srgbClr val="000000"/>
+          </a:solidFill>
+          <a:ln>
+            <a:noFill/>
+          </a:ln>
         </p:spPr>
-        <p:txBody>
-          <a:bodyPr vert="horz" wrap="square" lIns="91440" tIns="45720" rIns="91440" bIns="45720" numCol="1" anchor="t" anchorCtr="0" compatLnSpc="1">
-            <a:prstTxWarp prst="textNoShape">
-              <a:avLst/>
-            </a:prstTxWarp>
-          </a:bodyPr>
-          <a:lstStyle/>
-          <a:p>
+        <p:style>
+          <a:lnRef idx="2">
+            <a:schemeClr val="accent1">
+              <a:shade val="50000"/>
+            </a:schemeClr>
+          </a:lnRef>
+          <a:fillRef idx="1">
+            <a:schemeClr val="accent1"/>
+          </a:fillRef>
+          <a:effectRef idx="0">
+            <a:schemeClr val="accent1"/>
+          </a:effectRef>
+          <a:fontRef idx="minor">
+            <a:schemeClr val="lt1"/>
+          </a:fontRef>
+        </p:style>
+        <p:txBody>
+          <a:bodyPr rtlCol="0" anchor="ctr"/>
+          <a:lstStyle/>
+          <a:p>
+            <a:pPr algn="ctr"/>
             <a:endParaRPr lang="en-US"/>
           </a:p>
         </p:txBody>
       </p:sp>
       <p:pic>
         <p:nvPicPr>
-          <p:cNvPr id="7" name="Picture 6">
-            <a:extLst>
-              <a:ext uri="{FF2B5EF4-FFF2-40B4-BE49-F238E27FC236}">
-                <a16:creationId xmlns:a16="http://schemas.microsoft.com/office/drawing/2014/main" id="{317DFF18-CB95-4966-BB9C-126B8C483059}"/>
+          <p:cNvPr id="5" name="Picture 4">
+            <a:extLst>
+              <a:ext uri="{FF2B5EF4-FFF2-40B4-BE49-F238E27FC236}">
+                <a16:creationId xmlns:a16="http://schemas.microsoft.com/office/drawing/2014/main" id="{A5FF9D2B-DBD0-4C75-8C75-15B3B9496B78}"/>
               </a:ext>
             </a:extLst>
           </p:cNvPr>
@@ -5213,37 +5205,258 @@
           </p:cNvPicPr>
           <p:nvPr/>
         </p:nvPicPr>
-        <p:blipFill>
+        <p:blipFill rotWithShape="1">
           <a:blip r:embed="rId2">
+            <a:alphaModFix amt="35000"/>
             <a:extLst>
               <a:ext uri="{28A0092B-C50C-407E-A947-70E740481C1C}">
                 <a14:useLocalDpi xmlns:a14="http://schemas.microsoft.com/office/drawing/2010/main" val="0"/>
               </a:ext>
             </a:extLst>
           </a:blip>
-          <a:stretch>
-            <a:fillRect/>
-          </a:stretch>
+          <a:srcRect t="3097" b="12633"/>
+          <a:stretch/>
         </p:blipFill>
         <p:spPr>
           <a:xfrm>
-            <a:off x="5691543" y="1824511"/>
-            <a:ext cx="6076950" cy="4562475"/>
+            <a:off x="20" y="1"/>
+            <a:ext cx="12191980" cy="6857999"/>
           </a:xfrm>
           <a:prstGeom prst="rect">
             <a:avLst/>
           </a:prstGeom>
         </p:spPr>
       </p:pic>
+      <p:sp>
+        <p:nvSpPr>
+          <p:cNvPr id="2" name="Title 1">
+            <a:extLst>
+              <a:ext uri="{FF2B5EF4-FFF2-40B4-BE49-F238E27FC236}">
+                <a16:creationId xmlns:a16="http://schemas.microsoft.com/office/drawing/2014/main" id="{BD2DFAD1-F55F-4C59-ADE9-CD62CA1FC86A}"/>
+              </a:ext>
+            </a:extLst>
+          </p:cNvPr>
+          <p:cNvSpPr>
+            <a:spLocks noGrp="1"/>
+          </p:cNvSpPr>
+          <p:nvPr>
+            <p:ph type="title"/>
+          </p:nvPr>
+        </p:nvSpPr>
+        <p:spPr>
+          <a:xfrm>
+            <a:off x="838201" y="1065862"/>
+            <a:ext cx="3313164" cy="4726276"/>
+          </a:xfrm>
+        </p:spPr>
+        <p:txBody>
+          <a:bodyPr>
+            <a:normAutofit/>
+          </a:bodyPr>
+          <a:lstStyle/>
+          <a:p>
+            <a:pPr algn="r"/>
+            <a:r>
+              <a:rPr lang="en-US" sz="4000">
+                <a:solidFill>
+                  <a:srgbClr val="FFFFFF"/>
+                </a:solidFill>
+              </a:rPr>
+              <a:t>So, what is it?</a:t>
+            </a:r>
+          </a:p>
+        </p:txBody>
+      </p:sp>
+      <p:cxnSp>
+        <p:nvCxnSpPr>
+          <p:cNvPr id="15" name="Straight Connector 11">
+            <a:extLst>
+              <a:ext uri="{FF2B5EF4-FFF2-40B4-BE49-F238E27FC236}">
+                <a16:creationId xmlns:a16="http://schemas.microsoft.com/office/drawing/2014/main" id="{67182200-4859-4C8D-BCBB-55B245C28BA3}"/>
+              </a:ext>
+              <a:ext uri="{C183D7F6-B498-43B3-948B-1728B52AA6E4}">
+                <adec:decorative xmlns:adec="http://schemas.microsoft.com/office/drawing/2017/decorative" val="1"/>
+              </a:ext>
+            </a:extLst>
+          </p:cNvPr>
+          <p:cNvCxnSpPr>
+            <a:cxnSpLocks noGrp="1" noRot="1" noChangeAspect="1" noMove="1" noResize="1" noEditPoints="1" noAdjustHandles="1" noChangeArrowheads="1" noChangeShapeType="1"/>
+          </p:cNvCxnSpPr>
+          <p:nvPr>
+            <p:extLst>
+              <p:ext uri="{386F3935-93C4-4BCD-93E2-E3B085C9AB24}">
+                <p16:designElem xmlns:p16="http://schemas.microsoft.com/office/powerpoint/2015/main" val="1"/>
+              </p:ext>
+            </p:extLst>
+          </p:nvPr>
+        </p:nvCxnSpPr>
+        <p:spPr>
+          <a:xfrm>
+            <a:off x="4653372" y="2286000"/>
+            <a:ext cx="0" cy="2286000"/>
+          </a:xfrm>
+          <a:prstGeom prst="line">
+            <a:avLst/>
+          </a:prstGeom>
+          <a:ln w="15875">
+            <a:solidFill>
+              <a:srgbClr val="FFFFFF"/>
+            </a:solidFill>
+          </a:ln>
+        </p:spPr>
+        <p:style>
+          <a:lnRef idx="1">
+            <a:schemeClr val="accent1"/>
+          </a:lnRef>
+          <a:fillRef idx="0">
+            <a:schemeClr val="accent1"/>
+          </a:fillRef>
+          <a:effectRef idx="0">
+            <a:schemeClr val="accent1"/>
+          </a:effectRef>
+          <a:fontRef idx="minor">
+            <a:schemeClr val="tx1"/>
+          </a:fontRef>
+        </p:style>
+      </p:cxnSp>
+      <p:sp>
+        <p:nvSpPr>
+          <p:cNvPr id="3" name="Content Placeholder 2">
+            <a:extLst>
+              <a:ext uri="{FF2B5EF4-FFF2-40B4-BE49-F238E27FC236}">
+                <a16:creationId xmlns:a16="http://schemas.microsoft.com/office/drawing/2014/main" id="{08C3B8B8-4171-4486-8CC5-F87040D05FBD}"/>
+              </a:ext>
+            </a:extLst>
+          </p:cNvPr>
+          <p:cNvSpPr>
+            <a:spLocks noGrp="1"/>
+          </p:cNvSpPr>
+          <p:nvPr>
+            <p:ph idx="1"/>
+          </p:nvPr>
+        </p:nvSpPr>
+        <p:spPr>
+          <a:xfrm>
+            <a:off x="5155379" y="1065862"/>
+            <a:ext cx="5744685" cy="4726276"/>
+          </a:xfrm>
+        </p:spPr>
+        <p:txBody>
+          <a:bodyPr anchor="ctr">
+            <a:normAutofit/>
+          </a:bodyPr>
+          <a:lstStyle/>
+          <a:p>
+            <a:pPr marL="0" indent="0">
+              <a:buNone/>
+            </a:pPr>
+            <a:r>
+              <a:rPr lang="en-US" sz="1600">
+                <a:solidFill>
+                  <a:srgbClr val="FFFFFF"/>
+                </a:solidFill>
+              </a:rPr>
+              <a:t>Library</a:t>
+            </a:r>
+          </a:p>
+          <a:p>
+            <a:r>
+              <a:rPr lang="en-US" sz="1600">
+                <a:solidFill>
+                  <a:srgbClr val="FFFFFF"/>
+                </a:solidFill>
+              </a:rPr>
+              <a:t>A set of functions that you can call</a:t>
+            </a:r>
+          </a:p>
+          <a:p>
+            <a:r>
+              <a:rPr lang="en-US" sz="1600">
+                <a:solidFill>
+                  <a:srgbClr val="FFFFFF"/>
+                </a:solidFill>
+              </a:rPr>
+              <a:t>You choose the technologies that you want to use in your application such as: ReactJs, Axios, Flux, React-Router-Dom, React-Scroll</a:t>
+            </a:r>
+          </a:p>
+          <a:p>
+            <a:r>
+              <a:rPr lang="en-US" sz="1600">
+                <a:solidFill>
+                  <a:srgbClr val="FFFFFF"/>
+                </a:solidFill>
+              </a:rPr>
+              <a:t>Generally most frameworks extends the HTML with JavaScript but ReactJs takes advantage of JSX and uses JavaScript. JSX is basically a abstraction of React.createElement()</a:t>
+            </a:r>
+          </a:p>
+          <a:p>
+            <a:pPr marL="0" indent="0">
+              <a:buNone/>
+            </a:pPr>
+            <a:r>
+              <a:rPr lang="en-US" sz="1600">
+                <a:solidFill>
+                  <a:srgbClr val="FFFFFF"/>
+                </a:solidFill>
+              </a:rPr>
+              <a:t>Framework</a:t>
+            </a:r>
+          </a:p>
+          <a:p>
+            <a:r>
+              <a:rPr lang="en-US" sz="1600">
+                <a:solidFill>
+                  <a:srgbClr val="FFFFFF"/>
+                </a:solidFill>
+              </a:rPr>
+              <a:t>A framework embodies some abstract design and technologies to use</a:t>
+            </a:r>
+          </a:p>
+          <a:p>
+            <a:r>
+              <a:rPr lang="en-US" sz="1600">
+                <a:solidFill>
+                  <a:srgbClr val="FFFFFF"/>
+                </a:solidFill>
+              </a:rPr>
+              <a:t>When building a particular application, the application lives inside the framework</a:t>
+            </a:r>
+          </a:p>
+          <a:p>
+            <a:r>
+              <a:rPr lang="en-US" sz="1600">
+                <a:solidFill>
+                  <a:srgbClr val="FFFFFF"/>
+                </a:solidFill>
+              </a:rPr>
+              <a:t>The framework offers a tool for all of the items that your application may need (In Angular, no need for Axios you can you just import HttpClient from angular/core)</a:t>
+            </a:r>
+          </a:p>
+          <a:p>
+            <a:endParaRPr lang="en-US" sz="1600">
+              <a:solidFill>
+                <a:srgbClr val="FFFFFF"/>
+              </a:solidFill>
+            </a:endParaRPr>
+          </a:p>
+          <a:p>
+            <a:endParaRPr lang="en-US" sz="1600">
+              <a:solidFill>
+                <a:srgbClr val="FFFFFF"/>
+              </a:solidFill>
+            </a:endParaRPr>
+          </a:p>
+        </p:txBody>
+      </p:sp>
     </p:spTree>
     <p:extLst>
       <p:ext uri="{BB962C8B-B14F-4D97-AF65-F5344CB8AC3E}">
-        <p14:creationId xmlns:p14="http://schemas.microsoft.com/office/powerpoint/2010/main" val="2618350486"/>
+        <p14:creationId xmlns:p14="http://schemas.microsoft.com/office/powerpoint/2010/main" val="3674627539"/>
       </p:ext>
     </p:extLst>
   </p:cSld>
   <p:clrMapOvr>
-    <a:masterClrMapping/>
+    <a:overrideClrMapping bg1="dk1" tx1="lt1" bg2="dk2" tx2="lt2" accent1="accent1" accent2="accent2" accent3="accent3" accent4="accent4" accent5="accent5" accent6="accent6" hlink="hlink" folHlink="folHlink"/>
   </p:clrMapOvr>
 </p:sld>
 </file>
@@ -5251,6 +5464,14 @@
 <file path=ppt/slides/slide7.xml><?xml version="1.0" encoding="utf-8"?>
 <p:sld xmlns:a="http://schemas.openxmlformats.org/drawingml/2006/main" xmlns:r="http://schemas.openxmlformats.org/officeDocument/2006/relationships" xmlns:p="http://schemas.openxmlformats.org/presentationml/2006/main">
   <p:cSld>
+    <p:bg>
+      <p:bgPr>
+        <a:solidFill>
+          <a:schemeClr val="bg1"/>
+        </a:solidFill>
+        <a:effectLst/>
+      </p:bgPr>
+    </p:bg>
     <p:spTree>
       <p:nvGrpSpPr>
         <p:cNvPr id="1" name=""/>
@@ -5267,10 +5488,104 @@
       </p:grpSpPr>
       <p:sp>
         <p:nvSpPr>
+          <p:cNvPr id="10" name="Rectangle 9">
+            <a:extLst>
+              <a:ext uri="{FF2B5EF4-FFF2-40B4-BE49-F238E27FC236}">
+                <a16:creationId xmlns:a16="http://schemas.microsoft.com/office/drawing/2014/main" id="{823AC064-BC96-4F32-8AE1-B2FD38754823}"/>
+              </a:ext>
+              <a:ext uri="{C183D7F6-B498-43B3-948B-1728B52AA6E4}">
+                <adec:decorative xmlns:adec="http://schemas.microsoft.com/office/drawing/2017/decorative" val="1"/>
+              </a:ext>
+            </a:extLst>
+          </p:cNvPr>
+          <p:cNvSpPr>
+            <a:spLocks noGrp="1" noRot="1" noChangeAspect="1" noMove="1" noResize="1" noEditPoints="1" noAdjustHandles="1" noChangeArrowheads="1" noChangeShapeType="1" noTextEdit="1"/>
+          </p:cNvSpPr>
+          <p:nvPr>
+            <p:extLst>
+              <p:ext uri="{386F3935-93C4-4BCD-93E2-E3B085C9AB24}">
+                <p16:designElem xmlns:p16="http://schemas.microsoft.com/office/powerpoint/2015/main" val="1"/>
+              </p:ext>
+            </p:extLst>
+          </p:nvPr>
+        </p:nvSpPr>
+        <p:spPr bwMode="ltGray">
+          <a:xfrm>
+            <a:off x="378068" y="343486"/>
+            <a:ext cx="11438793" cy="1844256"/>
+          </a:xfrm>
+          <a:prstGeom prst="rect">
+            <a:avLst/>
+          </a:prstGeom>
+          <a:solidFill>
+            <a:srgbClr val="404040"/>
+          </a:solidFill>
+          <a:ln w="127000" cap="sq" cmpd="thinThick">
+            <a:solidFill>
+              <a:srgbClr val="404040"/>
+            </a:solidFill>
+          </a:ln>
+        </p:spPr>
+        <p:style>
+          <a:lnRef idx="2">
+            <a:schemeClr val="accent1">
+              <a:shade val="50000"/>
+            </a:schemeClr>
+          </a:lnRef>
+          <a:fillRef idx="1">
+            <a:schemeClr val="accent1"/>
+          </a:fillRef>
+          <a:effectRef idx="0">
+            <a:schemeClr val="accent1"/>
+          </a:effectRef>
+          <a:fontRef idx="minor">
+            <a:schemeClr val="lt1"/>
+          </a:fontRef>
+        </p:style>
+        <p:txBody>
+          <a:bodyPr rtlCol="0" anchor="ctr"/>
+          <a:lstStyle/>
+          <a:p>
+            <a:pPr marL="0" marR="0" lvl="0" indent="0" algn="ctr" defTabSz="914400" rtl="0" eaLnBrk="1" fontAlgn="auto" latinLnBrk="0" hangingPunct="1">
+              <a:lnSpc>
+                <a:spcPct val="100000"/>
+              </a:lnSpc>
+              <a:spcBef>
+                <a:spcPts val="0"/>
+              </a:spcBef>
+              <a:spcAft>
+                <a:spcPts val="0"/>
+              </a:spcAft>
+              <a:buClrTx/>
+              <a:buSzTx/>
+              <a:buFontTx/>
+              <a:buNone/>
+              <a:tabLst/>
+              <a:defRPr/>
+            </a:pPr>
+            <a:endParaRPr kumimoji="0" lang="en-US" sz="1800" b="0" i="0" u="none" strike="noStrike" kern="1200" cap="none" spc="0" normalizeH="0" baseline="0" noProof="0">
+              <a:ln>
+                <a:noFill/>
+              </a:ln>
+              <a:solidFill>
+                <a:prstClr val="white"/>
+              </a:solidFill>
+              <a:effectLst/>
+              <a:uLnTx/>
+              <a:uFillTx/>
+              <a:latin typeface="Calibri" panose="020F0502020204030204"/>
+              <a:ea typeface="+mn-ea"/>
+              <a:cs typeface="+mn-cs"/>
+            </a:endParaRPr>
+          </a:p>
+        </p:txBody>
+      </p:sp>
+      <p:sp>
+        <p:nvSpPr>
           <p:cNvPr id="2" name="Title 1">
             <a:extLst>
               <a:ext uri="{FF2B5EF4-FFF2-40B4-BE49-F238E27FC236}">
-                <a16:creationId xmlns:a16="http://schemas.microsoft.com/office/drawing/2014/main" id="{BD2DFAD1-F55F-4C59-ADE9-CD62CA1FC86A}"/>
+                <a16:creationId xmlns:a16="http://schemas.microsoft.com/office/drawing/2014/main" id="{8AD822CB-09B4-4447-9B6E-FE62F724EF8C}"/>
               </a:ext>
             </a:extLst>
           </p:cNvPr>
@@ -5279,66 +5594,102 @@
           </p:cNvSpPr>
           <p:nvPr>
             <p:ph type="title"/>
-          </p:nvPr>
-        </p:nvSpPr>
-        <p:spPr/>
-        <p:txBody>
-          <a:bodyPr/>
-          <a:lstStyle/>
-          <a:p>
-            <a:r>
-              <a:rPr lang="en-US" dirty="0"/>
-              <a:t>So, what is it?</a:t>
-            </a:r>
-          </a:p>
-        </p:txBody>
-      </p:sp>
-      <p:sp>
-        <p:nvSpPr>
-          <p:cNvPr id="3" name="Content Placeholder 2">
-            <a:extLst>
-              <a:ext uri="{FF2B5EF4-FFF2-40B4-BE49-F238E27FC236}">
-                <a16:creationId xmlns:a16="http://schemas.microsoft.com/office/drawing/2014/main" id="{08C3B8B8-4171-4486-8CC5-F87040D05FBD}"/>
-              </a:ext>
-            </a:extLst>
-          </p:cNvPr>
-          <p:cNvSpPr>
-            <a:spLocks noGrp="1"/>
-          </p:cNvSpPr>
-          <p:nvPr>
-            <p:ph idx="1"/>
           </p:nvPr>
         </p:nvSpPr>
         <p:spPr>
           <a:xfrm>
-            <a:off x="838200" y="1825625"/>
-            <a:ext cx="1539240" cy="573330"/>
+            <a:off x="526073" y="466578"/>
+            <a:ext cx="11139854" cy="930447"/>
           </a:xfrm>
         </p:spPr>
         <p:txBody>
-          <a:bodyPr/>
-          <a:lstStyle/>
-          <a:p>
-            <a:r>
-              <a:rPr lang="en-US" dirty="0"/>
-              <a:t>Library</a:t>
-            </a:r>
-          </a:p>
-        </p:txBody>
-      </p:sp>
+          <a:bodyPr vert="horz" lIns="91440" tIns="45720" rIns="91440" bIns="45720" rtlCol="0" anchor="b">
+            <a:normAutofit/>
+          </a:bodyPr>
+          <a:lstStyle/>
+          <a:p>
+            <a:pPr algn="ctr"/>
+            <a:r>
+              <a:rPr lang="en-US" sz="4200" kern="1200" dirty="0">
+                <a:solidFill>
+                  <a:srgbClr val="FFFFFF"/>
+                </a:solidFill>
+                <a:latin typeface="+mj-lt"/>
+                <a:ea typeface="+mj-ea"/>
+                <a:cs typeface="+mj-cs"/>
+              </a:rPr>
+              <a:t>A Visual difference between Framework/Library</a:t>
+            </a:r>
+          </a:p>
+        </p:txBody>
+      </p:sp>
+      <p:cxnSp>
+        <p:nvCxnSpPr>
+          <p:cNvPr id="12" name="Straight Connector 11">
+            <a:extLst>
+              <a:ext uri="{FF2B5EF4-FFF2-40B4-BE49-F238E27FC236}">
+                <a16:creationId xmlns:a16="http://schemas.microsoft.com/office/drawing/2014/main" id="{7E7C77BC-7138-40B1-A15B-20F57A494629}"/>
+              </a:ext>
+              <a:ext uri="{C183D7F6-B498-43B3-948B-1728B52AA6E4}">
+                <adec:decorative xmlns:adec="http://schemas.microsoft.com/office/drawing/2017/decorative" val="1"/>
+              </a:ext>
+            </a:extLst>
+          </p:cNvPr>
+          <p:cNvCxnSpPr>
+            <a:cxnSpLocks noGrp="1" noRot="1" noChangeAspect="1" noMove="1" noResize="1" noEditPoints="1" noAdjustHandles="1" noChangeArrowheads="1" noChangeShapeType="1"/>
+          </p:cNvCxnSpPr>
+          <p:nvPr>
+            <p:extLst>
+              <p:ext uri="{386F3935-93C4-4BCD-93E2-E3B085C9AB24}">
+                <p16:designElem xmlns:p16="http://schemas.microsoft.com/office/powerpoint/2015/main" val="1"/>
+              </p:ext>
+            </p:extLst>
+          </p:nvPr>
+        </p:nvCxnSpPr>
+        <p:spPr>
+          <a:xfrm>
+            <a:off x="2209800" y="1448631"/>
+            <a:ext cx="7772400" cy="0"/>
+          </a:xfrm>
+          <a:prstGeom prst="line">
+            <a:avLst/>
+          </a:prstGeom>
+          <a:ln w="22225">
+            <a:solidFill>
+              <a:srgbClr val="D9D9D9"/>
+            </a:solidFill>
+          </a:ln>
+        </p:spPr>
+        <p:style>
+          <a:lnRef idx="1">
+            <a:schemeClr val="accent1"/>
+          </a:lnRef>
+          <a:fillRef idx="0">
+            <a:schemeClr val="accent1"/>
+          </a:fillRef>
+          <a:effectRef idx="0">
+            <a:schemeClr val="accent1"/>
+          </a:effectRef>
+          <a:fontRef idx="minor">
+            <a:schemeClr val="tx1"/>
+          </a:fontRef>
+        </p:style>
+      </p:cxnSp>
       <p:pic>
         <p:nvPicPr>
-          <p:cNvPr id="5" name="Picture 4">
-            <a:extLst>
-              <a:ext uri="{FF2B5EF4-FFF2-40B4-BE49-F238E27FC236}">
-                <a16:creationId xmlns:a16="http://schemas.microsoft.com/office/drawing/2014/main" id="{A5FF9D2B-DBD0-4C75-8C75-15B3B9496B78}"/>
+          <p:cNvPr id="5" name="Content Placeholder 4">
+            <a:extLst>
+              <a:ext uri="{FF2B5EF4-FFF2-40B4-BE49-F238E27FC236}">
+                <a16:creationId xmlns:a16="http://schemas.microsoft.com/office/drawing/2014/main" id="{71C8A44B-AFA9-42FB-A200-B5B11587D7F0}"/>
               </a:ext>
             </a:extLst>
           </p:cNvPr>
           <p:cNvPicPr>
-            <a:picLocks noChangeAspect="1"/>
+            <a:picLocks noGrp="1" noChangeAspect="1"/>
           </p:cNvPicPr>
-          <p:nvPr/>
+          <p:nvPr>
+            <p:ph idx="1"/>
+          </p:nvPr>
         </p:nvPicPr>
         <p:blipFill>
           <a:blip r:embed="rId2">
@@ -5354,8 +5705,8 @@
         </p:blipFill>
         <p:spPr>
           <a:xfrm>
-            <a:off x="4253551" y="1690688"/>
-            <a:ext cx="6391701" cy="4261134"/>
+            <a:off x="975920" y="2509911"/>
+            <a:ext cx="10185061" cy="3997637"/>
           </a:xfrm>
           <a:prstGeom prst="rect">
             <a:avLst/>
@@ -5365,7 +5716,7 @@
     </p:spTree>
     <p:extLst>
       <p:ext uri="{BB962C8B-B14F-4D97-AF65-F5344CB8AC3E}">
-        <p14:creationId xmlns:p14="http://schemas.microsoft.com/office/powerpoint/2010/main" val="3674627539"/>
+        <p14:creationId xmlns:p14="http://schemas.microsoft.com/office/powerpoint/2010/main" val="1218244797"/>
       </p:ext>
     </p:extLst>
   </p:cSld>
@@ -5376,120 +5727,6 @@
 </file>
 
 <file path=ppt/slides/slide8.xml><?xml version="1.0" encoding="utf-8"?>
-<p:sld xmlns:a="http://schemas.openxmlformats.org/drawingml/2006/main" xmlns:r="http://schemas.openxmlformats.org/officeDocument/2006/relationships" xmlns:p="http://schemas.openxmlformats.org/presentationml/2006/main">
-  <p:cSld>
-    <p:spTree>
-      <p:nvGrpSpPr>
-        <p:cNvPr id="1" name=""/>
-        <p:cNvGrpSpPr/>
-        <p:nvPr/>
-      </p:nvGrpSpPr>
-      <p:grpSpPr>
-        <a:xfrm>
-          <a:off x="0" y="0"/>
-          <a:ext cx="0" cy="0"/>
-          <a:chOff x="0" y="0"/>
-          <a:chExt cx="0" cy="0"/>
-        </a:xfrm>
-      </p:grpSpPr>
-      <p:sp>
-        <p:nvSpPr>
-          <p:cNvPr id="2" name="Title 1">
-            <a:extLst>
-              <a:ext uri="{FF2B5EF4-FFF2-40B4-BE49-F238E27FC236}">
-                <a16:creationId xmlns:a16="http://schemas.microsoft.com/office/drawing/2014/main" id="{2BA0C0DA-C0BD-41DC-AD05-7B3A71AD7196}"/>
-              </a:ext>
-            </a:extLst>
-          </p:cNvPr>
-          <p:cNvSpPr>
-            <a:spLocks noGrp="1"/>
-          </p:cNvSpPr>
-          <p:nvPr>
-            <p:ph type="title"/>
-          </p:nvPr>
-        </p:nvSpPr>
-        <p:spPr>
-          <a:xfrm>
-            <a:off x="674237" y="914400"/>
-            <a:ext cx="3657600" cy="2887579"/>
-          </a:xfrm>
-        </p:spPr>
-        <p:txBody>
-          <a:bodyPr vert="horz" lIns="91440" tIns="45720" rIns="91440" bIns="45720" rtlCol="0" anchor="b">
-            <a:normAutofit/>
-          </a:bodyPr>
-          <a:lstStyle/>
-          <a:p>
-            <a:pPr algn="ctr"/>
-            <a:r>
-              <a:rPr lang="en-US" sz="4800" kern="1200">
-                <a:solidFill>
-                  <a:srgbClr val="FFFFFF"/>
-                </a:solidFill>
-                <a:latin typeface="+mj-lt"/>
-                <a:ea typeface="+mj-ea"/>
-                <a:cs typeface="+mj-cs"/>
-              </a:rPr>
-              <a:t>Separation of Concerns</a:t>
-            </a:r>
-          </a:p>
-        </p:txBody>
-      </p:sp>
-      <p:pic>
-        <p:nvPicPr>
-          <p:cNvPr id="5" name="Content Placeholder 4">
-            <a:extLst>
-              <a:ext uri="{FF2B5EF4-FFF2-40B4-BE49-F238E27FC236}">
-                <a16:creationId xmlns:a16="http://schemas.microsoft.com/office/drawing/2014/main" id="{78E19CB9-5A96-4D6F-8EEF-6EDEF14981B8}"/>
-              </a:ext>
-            </a:extLst>
-          </p:cNvPr>
-          <p:cNvPicPr>
-            <a:picLocks noGrp="1" noChangeAspect="1"/>
-          </p:cNvPicPr>
-          <p:nvPr>
-            <p:ph idx="1"/>
-          </p:nvPr>
-        </p:nvPicPr>
-        <p:blipFill>
-          <a:blip r:embed="rId2">
-            <a:extLst>
-              <a:ext uri="{28A0092B-C50C-407E-A947-70E740481C1C}">
-                <a14:useLocalDpi xmlns:a14="http://schemas.microsoft.com/office/drawing/2010/main" val="0"/>
-              </a:ext>
-              <a:ext uri="{837473B0-CC2E-450A-ABE3-18F120FF3D39}">
-                <a1611:picAttrSrcUrl xmlns:a1611="http://schemas.microsoft.com/office/drawing/2016/11/main" r:id="rId3"/>
-              </a:ext>
-            </a:extLst>
-          </a:blip>
-          <a:stretch>
-            <a:fillRect/>
-          </a:stretch>
-        </p:blipFill>
-        <p:spPr>
-          <a:xfrm>
-            <a:off x="1049852" y="572216"/>
-            <a:ext cx="9929428" cy="5585304"/>
-          </a:xfrm>
-          <a:prstGeom prst="rect">
-            <a:avLst/>
-          </a:prstGeom>
-        </p:spPr>
-      </p:pic>
-    </p:spTree>
-    <p:extLst>
-      <p:ext uri="{BB962C8B-B14F-4D97-AF65-F5344CB8AC3E}">
-        <p14:creationId xmlns:p14="http://schemas.microsoft.com/office/powerpoint/2010/main" val="2960244171"/>
-      </p:ext>
-    </p:extLst>
-  </p:cSld>
-  <p:clrMapOvr>
-    <a:masterClrMapping/>
-  </p:clrMapOvr>
-</p:sld>
-</file>
-
-<file path=ppt/slides/slide9.xml><?xml version="1.0" encoding="utf-8"?>
 <p:sld xmlns:a="http://schemas.openxmlformats.org/drawingml/2006/main" xmlns:r="http://schemas.openxmlformats.org/officeDocument/2006/relationships" xmlns:p="http://schemas.openxmlformats.org/presentationml/2006/main">
   <p:cSld>
     <p:bg>
@@ -5724,8 +5961,8 @@
         </p:blipFill>
         <p:spPr>
           <a:xfrm>
-            <a:off x="4038600" y="1459536"/>
-            <a:ext cx="7188199" cy="3935538"/>
+            <a:off x="3153612" y="637563"/>
+            <a:ext cx="8073187" cy="5645791"/>
           </a:xfrm>
           <a:prstGeom prst="rect">
             <a:avLst/>
@@ -5736,6 +5973,250 @@
     <p:extLst>
       <p:ext uri="{BB962C8B-B14F-4D97-AF65-F5344CB8AC3E}">
         <p14:creationId xmlns:p14="http://schemas.microsoft.com/office/powerpoint/2010/main" val="3463946540"/>
+      </p:ext>
+    </p:extLst>
+  </p:cSld>
+  <p:clrMapOvr>
+    <a:masterClrMapping/>
+  </p:clrMapOvr>
+</p:sld>
+</file>
+
+<file path=ppt/slides/slide9.xml><?xml version="1.0" encoding="utf-8"?>
+<p:sld xmlns:a="http://schemas.openxmlformats.org/drawingml/2006/main" xmlns:r="http://schemas.openxmlformats.org/officeDocument/2006/relationships" xmlns:p="http://schemas.openxmlformats.org/presentationml/2006/main">
+  <p:cSld>
+    <p:spTree>
+      <p:nvGrpSpPr>
+        <p:cNvPr id="1" name=""/>
+        <p:cNvGrpSpPr/>
+        <p:nvPr/>
+      </p:nvGrpSpPr>
+      <p:grpSpPr>
+        <a:xfrm>
+          <a:off x="0" y="0"/>
+          <a:ext cx="0" cy="0"/>
+          <a:chOff x="0" y="0"/>
+          <a:chExt cx="0" cy="0"/>
+        </a:xfrm>
+      </p:grpSpPr>
+      <p:sp>
+        <p:nvSpPr>
+          <p:cNvPr id="2" name="Title 1">
+            <a:extLst>
+              <a:ext uri="{FF2B5EF4-FFF2-40B4-BE49-F238E27FC236}">
+                <a16:creationId xmlns:a16="http://schemas.microsoft.com/office/drawing/2014/main" id="{C6ADBBF2-F034-4560-AB9F-2EFC5AAC6339}"/>
+              </a:ext>
+            </a:extLst>
+          </p:cNvPr>
+          <p:cNvSpPr>
+            <a:spLocks noGrp="1"/>
+          </p:cNvSpPr>
+          <p:nvPr>
+            <p:ph type="title"/>
+          </p:nvPr>
+        </p:nvSpPr>
+        <p:spPr>
+          <a:xfrm>
+            <a:off x="839788" y="365125"/>
+            <a:ext cx="10515600" cy="644525"/>
+          </a:xfrm>
+        </p:spPr>
+        <p:txBody>
+          <a:bodyPr>
+            <a:normAutofit fontScale="90000"/>
+          </a:bodyPr>
+          <a:lstStyle/>
+          <a:p>
+            <a:pPr algn="ctr"/>
+            <a:r>
+              <a:rPr lang="en-US" dirty="0"/>
+              <a:t>Uncontrolled and Controlled components.</a:t>
+            </a:r>
+            <a:br>
+              <a:rPr lang="en-US" dirty="0"/>
+            </a:br>
+            <a:endParaRPr lang="en-US" dirty="0"/>
+          </a:p>
+        </p:txBody>
+      </p:sp>
+      <p:sp>
+        <p:nvSpPr>
+          <p:cNvPr id="3" name="Text Placeholder 2">
+            <a:extLst>
+              <a:ext uri="{FF2B5EF4-FFF2-40B4-BE49-F238E27FC236}">
+                <a16:creationId xmlns:a16="http://schemas.microsoft.com/office/drawing/2014/main" id="{736C2F82-34A4-40D8-8FF6-D474CE3E4DAD}"/>
+              </a:ext>
+            </a:extLst>
+          </p:cNvPr>
+          <p:cNvSpPr>
+            <a:spLocks noGrp="1"/>
+          </p:cNvSpPr>
+          <p:nvPr>
+            <p:ph type="body" idx="1"/>
+          </p:nvPr>
+        </p:nvSpPr>
+        <p:spPr>
+          <a:xfrm>
+            <a:off x="839788" y="1690688"/>
+            <a:ext cx="5157787" cy="823912"/>
+          </a:xfrm>
+        </p:spPr>
+        <p:txBody>
+          <a:bodyPr/>
+          <a:lstStyle/>
+          <a:p>
+            <a:pPr algn="ctr"/>
+            <a:r>
+              <a:rPr lang="en-US" dirty="0"/>
+              <a:t>Controlled</a:t>
+            </a:r>
+          </a:p>
+        </p:txBody>
+      </p:sp>
+      <p:sp>
+        <p:nvSpPr>
+          <p:cNvPr id="4" name="Content Placeholder 3">
+            <a:extLst>
+              <a:ext uri="{FF2B5EF4-FFF2-40B4-BE49-F238E27FC236}">
+                <a16:creationId xmlns:a16="http://schemas.microsoft.com/office/drawing/2014/main" id="{3B146C61-EEB7-4965-91B5-C4927FF00604}"/>
+              </a:ext>
+            </a:extLst>
+          </p:cNvPr>
+          <p:cNvSpPr>
+            <a:spLocks noGrp="1"/>
+          </p:cNvSpPr>
+          <p:nvPr>
+            <p:ph sz="half" idx="2"/>
+          </p:nvPr>
+        </p:nvSpPr>
+        <p:spPr/>
+        <p:txBody>
+          <a:bodyPr/>
+          <a:lstStyle/>
+          <a:p>
+            <a:r>
+              <a:rPr lang="en-US" dirty="0"/>
+              <a:t>You specify the value of the input with a state variable, every time a user enters a value, the state is updated via a function call</a:t>
+            </a:r>
+          </a:p>
+          <a:p>
+            <a:r>
+              <a:rPr lang="en-US" dirty="0"/>
+              <a:t>Uses the virtual DOM</a:t>
+            </a:r>
+          </a:p>
+        </p:txBody>
+      </p:sp>
+      <p:sp>
+        <p:nvSpPr>
+          <p:cNvPr id="5" name="Text Placeholder 4">
+            <a:extLst>
+              <a:ext uri="{FF2B5EF4-FFF2-40B4-BE49-F238E27FC236}">
+                <a16:creationId xmlns:a16="http://schemas.microsoft.com/office/drawing/2014/main" id="{91A94C35-8667-4899-BC73-0A29D7B29325}"/>
+              </a:ext>
+            </a:extLst>
+          </p:cNvPr>
+          <p:cNvSpPr>
+            <a:spLocks noGrp="1"/>
+          </p:cNvSpPr>
+          <p:nvPr>
+            <p:ph type="body" sz="quarter" idx="3"/>
+          </p:nvPr>
+        </p:nvSpPr>
+        <p:spPr>
+          <a:xfrm>
+            <a:off x="6172200" y="1681163"/>
+            <a:ext cx="5183188" cy="823912"/>
+          </a:xfrm>
+        </p:spPr>
+        <p:txBody>
+          <a:bodyPr/>
+          <a:lstStyle/>
+          <a:p>
+            <a:pPr algn="ctr"/>
+            <a:r>
+              <a:rPr lang="en-US" dirty="0"/>
+              <a:t>Uncontrolled</a:t>
+            </a:r>
+          </a:p>
+        </p:txBody>
+      </p:sp>
+      <p:sp>
+        <p:nvSpPr>
+          <p:cNvPr id="6" name="Content Placeholder 5">
+            <a:extLst>
+              <a:ext uri="{FF2B5EF4-FFF2-40B4-BE49-F238E27FC236}">
+                <a16:creationId xmlns:a16="http://schemas.microsoft.com/office/drawing/2014/main" id="{9AE9532C-1224-457B-ADD1-B084F508DE32}"/>
+              </a:ext>
+            </a:extLst>
+          </p:cNvPr>
+          <p:cNvSpPr>
+            <a:spLocks noGrp="1"/>
+          </p:cNvSpPr>
+          <p:nvPr>
+            <p:ph sz="quarter" idx="4"/>
+          </p:nvPr>
+        </p:nvSpPr>
+        <p:spPr/>
+        <p:txBody>
+          <a:bodyPr/>
+          <a:lstStyle/>
+          <a:p>
+            <a:r>
+              <a:rPr lang="en-US" dirty="0"/>
+              <a:t>Uses the DOM</a:t>
+            </a:r>
+          </a:p>
+          <a:p>
+            <a:r>
+              <a:rPr lang="en-US" dirty="0"/>
+              <a:t>Binds to DOM elements using the Ref keyword, or using a event object</a:t>
+            </a:r>
+          </a:p>
+          <a:p>
+            <a:endParaRPr lang="en-US" dirty="0"/>
+          </a:p>
+        </p:txBody>
+      </p:sp>
+      <p:sp>
+        <p:nvSpPr>
+          <p:cNvPr id="7" name="TextBox 6">
+            <a:extLst>
+              <a:ext uri="{FF2B5EF4-FFF2-40B4-BE49-F238E27FC236}">
+                <a16:creationId xmlns:a16="http://schemas.microsoft.com/office/drawing/2014/main" id="{11B02B32-1951-4C07-93AD-317C7BC2D32E}"/>
+              </a:ext>
+            </a:extLst>
+          </p:cNvPr>
+          <p:cNvSpPr txBox="1"/>
+          <p:nvPr/>
+        </p:nvSpPr>
+        <p:spPr>
+          <a:xfrm>
+            <a:off x="2972594" y="1084541"/>
+            <a:ext cx="6246812" cy="369332"/>
+          </a:xfrm>
+          <a:prstGeom prst="rect">
+            <a:avLst/>
+          </a:prstGeom>
+          <a:noFill/>
+        </p:spPr>
+        <p:txBody>
+          <a:bodyPr wrap="square" rtlCol="0">
+            <a:spAutoFit/>
+          </a:bodyPr>
+          <a:lstStyle/>
+          <a:p>
+            <a:r>
+              <a:rPr lang="en-US" dirty="0"/>
+              <a:t>Describes the method of obtaining input data from HTML inputs.</a:t>
+            </a:r>
+          </a:p>
+        </p:txBody>
+      </p:sp>
+    </p:spTree>
+    <p:extLst>
+      <p:ext uri="{BB962C8B-B14F-4D97-AF65-F5344CB8AC3E}">
+        <p14:creationId xmlns:p14="http://schemas.microsoft.com/office/powerpoint/2010/main" val="3796533581"/>
       </p:ext>
     </p:extLst>
   </p:cSld>

</xml_diff>

<commit_message>
Added React vs Angular slide
</commit_message>
<xml_diff>
--- a/PowerPoint/React.pptx
+++ b/PowerPoint/React.pptx
@@ -296,7 +296,7 @@
           <a:p>
             <a:fld id="{4A105A33-B027-4A7D-BC88-BF07D2F361B2}" type="datetimeFigureOut">
               <a:rPr lang="en-US" smtClean="0"/>
-              <a:t>9/17/2018</a:t>
+              <a:t>9/20/2018</a:t>
             </a:fld>
             <a:endParaRPr lang="en-US"/>
           </a:p>
@@ -494,7 +494,7 @@
           <a:p>
             <a:fld id="{4A105A33-B027-4A7D-BC88-BF07D2F361B2}" type="datetimeFigureOut">
               <a:rPr lang="en-US" smtClean="0"/>
-              <a:t>9/17/2018</a:t>
+              <a:t>9/20/2018</a:t>
             </a:fld>
             <a:endParaRPr lang="en-US"/>
           </a:p>
@@ -702,7 +702,7 @@
           <a:p>
             <a:fld id="{4A105A33-B027-4A7D-BC88-BF07D2F361B2}" type="datetimeFigureOut">
               <a:rPr lang="en-US" smtClean="0"/>
-              <a:t>9/17/2018</a:t>
+              <a:t>9/20/2018</a:t>
             </a:fld>
             <a:endParaRPr lang="en-US"/>
           </a:p>
@@ -900,7 +900,7 @@
           <a:p>
             <a:fld id="{4A105A33-B027-4A7D-BC88-BF07D2F361B2}" type="datetimeFigureOut">
               <a:rPr lang="en-US" smtClean="0"/>
-              <a:t>9/17/2018</a:t>
+              <a:t>9/20/2018</a:t>
             </a:fld>
             <a:endParaRPr lang="en-US"/>
           </a:p>
@@ -1175,7 +1175,7 @@
           <a:p>
             <a:fld id="{4A105A33-B027-4A7D-BC88-BF07D2F361B2}" type="datetimeFigureOut">
               <a:rPr lang="en-US" smtClean="0"/>
-              <a:t>9/17/2018</a:t>
+              <a:t>9/20/2018</a:t>
             </a:fld>
             <a:endParaRPr lang="en-US"/>
           </a:p>
@@ -1440,7 +1440,7 @@
           <a:p>
             <a:fld id="{4A105A33-B027-4A7D-BC88-BF07D2F361B2}" type="datetimeFigureOut">
               <a:rPr lang="en-US" smtClean="0"/>
-              <a:t>9/17/2018</a:t>
+              <a:t>9/20/2018</a:t>
             </a:fld>
             <a:endParaRPr lang="en-US"/>
           </a:p>
@@ -1852,7 +1852,7 @@
           <a:p>
             <a:fld id="{4A105A33-B027-4A7D-BC88-BF07D2F361B2}" type="datetimeFigureOut">
               <a:rPr lang="en-US" smtClean="0"/>
-              <a:t>9/17/2018</a:t>
+              <a:t>9/20/2018</a:t>
             </a:fld>
             <a:endParaRPr lang="en-US"/>
           </a:p>
@@ -1993,7 +1993,7 @@
           <a:p>
             <a:fld id="{4A105A33-B027-4A7D-BC88-BF07D2F361B2}" type="datetimeFigureOut">
               <a:rPr lang="en-US" smtClean="0"/>
-              <a:t>9/17/2018</a:t>
+              <a:t>9/20/2018</a:t>
             </a:fld>
             <a:endParaRPr lang="en-US"/>
           </a:p>
@@ -2106,7 +2106,7 @@
           <a:p>
             <a:fld id="{4A105A33-B027-4A7D-BC88-BF07D2F361B2}" type="datetimeFigureOut">
               <a:rPr lang="en-US" smtClean="0"/>
-              <a:t>9/17/2018</a:t>
+              <a:t>9/20/2018</a:t>
             </a:fld>
             <a:endParaRPr lang="en-US"/>
           </a:p>
@@ -2417,7 +2417,7 @@
           <a:p>
             <a:fld id="{4A105A33-B027-4A7D-BC88-BF07D2F361B2}" type="datetimeFigureOut">
               <a:rPr lang="en-US" smtClean="0"/>
-              <a:t>9/17/2018</a:t>
+              <a:t>9/20/2018</a:t>
             </a:fld>
             <a:endParaRPr lang="en-US"/>
           </a:p>
@@ -2705,7 +2705,7 @@
           <a:p>
             <a:fld id="{4A105A33-B027-4A7D-BC88-BF07D2F361B2}" type="datetimeFigureOut">
               <a:rPr lang="en-US" smtClean="0"/>
-              <a:t>9/17/2018</a:t>
+              <a:t>9/20/2018</a:t>
             </a:fld>
             <a:endParaRPr lang="en-US"/>
           </a:p>
@@ -2946,7 +2946,7 @@
           <a:p>
             <a:fld id="{4A105A33-B027-4A7D-BC88-BF07D2F361B2}" type="datetimeFigureOut">
               <a:rPr lang="en-US" smtClean="0"/>
-              <a:t>9/17/2018</a:t>
+              <a:t>9/20/2018</a:t>
             </a:fld>
             <a:endParaRPr lang="en-US"/>
           </a:p>
@@ -4691,15 +4691,322 @@
             <p:ph idx="1"/>
           </p:nvPr>
         </p:nvSpPr>
-        <p:spPr/>
+        <p:spPr>
+          <a:xfrm>
+            <a:off x="838200" y="3063379"/>
+            <a:ext cx="4673367" cy="2997535"/>
+          </a:xfrm>
+        </p:spPr>
         <p:txBody>
           <a:bodyPr/>
           <a:lstStyle/>
           <a:p>
             <a:r>
               <a:rPr lang="en-US" dirty="0"/>
-              <a:t>Give specific advantages it has over angular</a:t>
-            </a:r>
+              <a:t>JSX</a:t>
+            </a:r>
+          </a:p>
+          <a:p>
+            <a:r>
+              <a:rPr lang="en-US" dirty="0"/>
+              <a:t>Flexibility (Libraries)</a:t>
+            </a:r>
+          </a:p>
+          <a:p>
+            <a:r>
+              <a:rPr lang="en-US" dirty="0" err="1"/>
+              <a:t>Javascript</a:t>
+            </a:r>
+            <a:r>
+              <a:rPr lang="en-US" dirty="0"/>
+              <a:t> focused</a:t>
+            </a:r>
+          </a:p>
+        </p:txBody>
+      </p:sp>
+      <p:sp>
+        <p:nvSpPr>
+          <p:cNvPr id="4" name="TextBox 3">
+            <a:extLst>
+              <a:ext uri="{FF2B5EF4-FFF2-40B4-BE49-F238E27FC236}">
+                <a16:creationId xmlns:a16="http://schemas.microsoft.com/office/drawing/2014/main" id="{BC4112C4-E5A6-4351-8A61-2001900E9144}"/>
+              </a:ext>
+            </a:extLst>
+          </p:cNvPr>
+          <p:cNvSpPr txBox="1"/>
+          <p:nvPr/>
+        </p:nvSpPr>
+        <p:spPr>
+          <a:xfrm>
+            <a:off x="1089870" y="2111892"/>
+            <a:ext cx="1552662" cy="646331"/>
+          </a:xfrm>
+          <a:prstGeom prst="rect">
+            <a:avLst/>
+          </a:prstGeom>
+          <a:noFill/>
+        </p:spPr>
+        <p:txBody>
+          <a:bodyPr wrap="square" rtlCol="0">
+            <a:spAutoFit/>
+          </a:bodyPr>
+          <a:lstStyle/>
+          <a:p>
+            <a:r>
+              <a:rPr lang="en-US" sz="3600" b="1" dirty="0"/>
+              <a:t>REACT</a:t>
+            </a:r>
+          </a:p>
+        </p:txBody>
+      </p:sp>
+      <p:sp>
+        <p:nvSpPr>
+          <p:cNvPr id="5" name="TextBox 4">
+            <a:extLst>
+              <a:ext uri="{FF2B5EF4-FFF2-40B4-BE49-F238E27FC236}">
+                <a16:creationId xmlns:a16="http://schemas.microsoft.com/office/drawing/2014/main" id="{0317BAB8-EE2D-410D-A3B2-997E87AD1496}"/>
+              </a:ext>
+            </a:extLst>
+          </p:cNvPr>
+          <p:cNvSpPr txBox="1"/>
+          <p:nvPr/>
+        </p:nvSpPr>
+        <p:spPr>
+          <a:xfrm>
+            <a:off x="6677637" y="2111892"/>
+            <a:ext cx="2130804" cy="646331"/>
+          </a:xfrm>
+          <a:prstGeom prst="rect">
+            <a:avLst/>
+          </a:prstGeom>
+          <a:noFill/>
+        </p:spPr>
+        <p:txBody>
+          <a:bodyPr wrap="square" rtlCol="0">
+            <a:spAutoFit/>
+          </a:bodyPr>
+          <a:lstStyle/>
+          <a:p>
+            <a:r>
+              <a:rPr lang="en-US" sz="3600" b="1" dirty="0"/>
+              <a:t>ANGULAR</a:t>
+            </a:r>
+          </a:p>
+        </p:txBody>
+      </p:sp>
+      <p:sp>
+        <p:nvSpPr>
+          <p:cNvPr id="6" name="Content Placeholder 2">
+            <a:extLst>
+              <a:ext uri="{FF2B5EF4-FFF2-40B4-BE49-F238E27FC236}">
+                <a16:creationId xmlns:a16="http://schemas.microsoft.com/office/drawing/2014/main" id="{65E0A0FA-182E-4C1B-BB34-F8B076A28679}"/>
+              </a:ext>
+            </a:extLst>
+          </p:cNvPr>
+          <p:cNvSpPr txBox="1">
+            <a:spLocks/>
+          </p:cNvSpPr>
+          <p:nvPr/>
+        </p:nvSpPr>
+        <p:spPr>
+          <a:xfrm>
+            <a:off x="6471757" y="3063380"/>
+            <a:ext cx="4673367" cy="2997535"/>
+          </a:xfrm>
+          <a:prstGeom prst="rect">
+            <a:avLst/>
+          </a:prstGeom>
+        </p:spPr>
+        <p:txBody>
+          <a:bodyPr vert="horz" lIns="91440" tIns="45720" rIns="91440" bIns="45720" rtlCol="0">
+            <a:normAutofit/>
+          </a:bodyPr>
+          <a:lstStyle>
+            <a:lvl1pPr marL="228600" indent="-228600" algn="l" defTabSz="914400" rtl="0" eaLnBrk="1" latinLnBrk="0" hangingPunct="1">
+              <a:lnSpc>
+                <a:spcPct val="90000"/>
+              </a:lnSpc>
+              <a:spcBef>
+                <a:spcPts val="1000"/>
+              </a:spcBef>
+              <a:buFont typeface="Arial" panose="020B0604020202020204" pitchFamily="34" charset="0"/>
+              <a:buChar char="•"/>
+              <a:defRPr sz="2800" kern="1200">
+                <a:solidFill>
+                  <a:schemeClr val="tx1"/>
+                </a:solidFill>
+                <a:latin typeface="+mn-lt"/>
+                <a:ea typeface="+mn-ea"/>
+                <a:cs typeface="+mn-cs"/>
+              </a:defRPr>
+            </a:lvl1pPr>
+            <a:lvl2pPr marL="685800" indent="-228600" algn="l" defTabSz="914400" rtl="0" eaLnBrk="1" latinLnBrk="0" hangingPunct="1">
+              <a:lnSpc>
+                <a:spcPct val="90000"/>
+              </a:lnSpc>
+              <a:spcBef>
+                <a:spcPts val="500"/>
+              </a:spcBef>
+              <a:buFont typeface="Arial" panose="020B0604020202020204" pitchFamily="34" charset="0"/>
+              <a:buChar char="•"/>
+              <a:defRPr sz="2400" kern="1200">
+                <a:solidFill>
+                  <a:schemeClr val="tx1"/>
+                </a:solidFill>
+                <a:latin typeface="+mn-lt"/>
+                <a:ea typeface="+mn-ea"/>
+                <a:cs typeface="+mn-cs"/>
+              </a:defRPr>
+            </a:lvl2pPr>
+            <a:lvl3pPr marL="1143000" indent="-228600" algn="l" defTabSz="914400" rtl="0" eaLnBrk="1" latinLnBrk="0" hangingPunct="1">
+              <a:lnSpc>
+                <a:spcPct val="90000"/>
+              </a:lnSpc>
+              <a:spcBef>
+                <a:spcPts val="500"/>
+              </a:spcBef>
+              <a:buFont typeface="Arial" panose="020B0604020202020204" pitchFamily="34" charset="0"/>
+              <a:buChar char="•"/>
+              <a:defRPr sz="2000" kern="1200">
+                <a:solidFill>
+                  <a:schemeClr val="tx1"/>
+                </a:solidFill>
+                <a:latin typeface="+mn-lt"/>
+                <a:ea typeface="+mn-ea"/>
+                <a:cs typeface="+mn-cs"/>
+              </a:defRPr>
+            </a:lvl3pPr>
+            <a:lvl4pPr marL="1600200" indent="-228600" algn="l" defTabSz="914400" rtl="0" eaLnBrk="1" latinLnBrk="0" hangingPunct="1">
+              <a:lnSpc>
+                <a:spcPct val="90000"/>
+              </a:lnSpc>
+              <a:spcBef>
+                <a:spcPts val="500"/>
+              </a:spcBef>
+              <a:buFont typeface="Arial" panose="020B0604020202020204" pitchFamily="34" charset="0"/>
+              <a:buChar char="•"/>
+              <a:defRPr sz="1800" kern="1200">
+                <a:solidFill>
+                  <a:schemeClr val="tx1"/>
+                </a:solidFill>
+                <a:latin typeface="+mn-lt"/>
+                <a:ea typeface="+mn-ea"/>
+                <a:cs typeface="+mn-cs"/>
+              </a:defRPr>
+            </a:lvl4pPr>
+            <a:lvl5pPr marL="2057400" indent="-228600" algn="l" defTabSz="914400" rtl="0" eaLnBrk="1" latinLnBrk="0" hangingPunct="1">
+              <a:lnSpc>
+                <a:spcPct val="90000"/>
+              </a:lnSpc>
+              <a:spcBef>
+                <a:spcPts val="500"/>
+              </a:spcBef>
+              <a:buFont typeface="Arial" panose="020B0604020202020204" pitchFamily="34" charset="0"/>
+              <a:buChar char="•"/>
+              <a:defRPr sz="1800" kern="1200">
+                <a:solidFill>
+                  <a:schemeClr val="tx1"/>
+                </a:solidFill>
+                <a:latin typeface="+mn-lt"/>
+                <a:ea typeface="+mn-ea"/>
+                <a:cs typeface="+mn-cs"/>
+              </a:defRPr>
+            </a:lvl5pPr>
+            <a:lvl6pPr marL="2514600" indent="-228600" algn="l" defTabSz="914400" rtl="0" eaLnBrk="1" latinLnBrk="0" hangingPunct="1">
+              <a:lnSpc>
+                <a:spcPct val="90000"/>
+              </a:lnSpc>
+              <a:spcBef>
+                <a:spcPts val="500"/>
+              </a:spcBef>
+              <a:buFont typeface="Arial" panose="020B0604020202020204" pitchFamily="34" charset="0"/>
+              <a:buChar char="•"/>
+              <a:defRPr sz="1800" kern="1200">
+                <a:solidFill>
+                  <a:schemeClr val="tx1"/>
+                </a:solidFill>
+                <a:latin typeface="+mn-lt"/>
+                <a:ea typeface="+mn-ea"/>
+                <a:cs typeface="+mn-cs"/>
+              </a:defRPr>
+            </a:lvl6pPr>
+            <a:lvl7pPr marL="2971800" indent="-228600" algn="l" defTabSz="914400" rtl="0" eaLnBrk="1" latinLnBrk="0" hangingPunct="1">
+              <a:lnSpc>
+                <a:spcPct val="90000"/>
+              </a:lnSpc>
+              <a:spcBef>
+                <a:spcPts val="500"/>
+              </a:spcBef>
+              <a:buFont typeface="Arial" panose="020B0604020202020204" pitchFamily="34" charset="0"/>
+              <a:buChar char="•"/>
+              <a:defRPr sz="1800" kern="1200">
+                <a:solidFill>
+                  <a:schemeClr val="tx1"/>
+                </a:solidFill>
+                <a:latin typeface="+mn-lt"/>
+                <a:ea typeface="+mn-ea"/>
+                <a:cs typeface="+mn-cs"/>
+              </a:defRPr>
+            </a:lvl7pPr>
+            <a:lvl8pPr marL="3429000" indent="-228600" algn="l" defTabSz="914400" rtl="0" eaLnBrk="1" latinLnBrk="0" hangingPunct="1">
+              <a:lnSpc>
+                <a:spcPct val="90000"/>
+              </a:lnSpc>
+              <a:spcBef>
+                <a:spcPts val="500"/>
+              </a:spcBef>
+              <a:buFont typeface="Arial" panose="020B0604020202020204" pitchFamily="34" charset="0"/>
+              <a:buChar char="•"/>
+              <a:defRPr sz="1800" kern="1200">
+                <a:solidFill>
+                  <a:schemeClr val="tx1"/>
+                </a:solidFill>
+                <a:latin typeface="+mn-lt"/>
+                <a:ea typeface="+mn-ea"/>
+                <a:cs typeface="+mn-cs"/>
+              </a:defRPr>
+            </a:lvl8pPr>
+            <a:lvl9pPr marL="3886200" indent="-228600" algn="l" defTabSz="914400" rtl="0" eaLnBrk="1" latinLnBrk="0" hangingPunct="1">
+              <a:lnSpc>
+                <a:spcPct val="90000"/>
+              </a:lnSpc>
+              <a:spcBef>
+                <a:spcPts val="500"/>
+              </a:spcBef>
+              <a:buFont typeface="Arial" panose="020B0604020202020204" pitchFamily="34" charset="0"/>
+              <a:buChar char="•"/>
+              <a:defRPr sz="1800" kern="1200">
+                <a:solidFill>
+                  <a:schemeClr val="tx1"/>
+                </a:solidFill>
+                <a:latin typeface="+mn-lt"/>
+                <a:ea typeface="+mn-ea"/>
+                <a:cs typeface="+mn-cs"/>
+              </a:defRPr>
+            </a:lvl9pPr>
+          </a:lstStyle>
+          <a:p>
+            <a:r>
+              <a:rPr lang="en-US" dirty="0"/>
+              <a:t>Typescript</a:t>
+            </a:r>
+          </a:p>
+          <a:p>
+            <a:r>
+              <a:rPr lang="en-US" dirty="0"/>
+              <a:t>Framework</a:t>
+            </a:r>
+          </a:p>
+          <a:p>
+            <a:r>
+              <a:rPr lang="en-US" dirty="0"/>
+              <a:t>OOP </a:t>
+            </a:r>
+            <a:r>
+              <a:rPr lang="en-US" dirty="0" err="1"/>
+              <a:t>focues</a:t>
+            </a:r>
+            <a:endParaRPr lang="en-US" dirty="0"/>
           </a:p>
         </p:txBody>
       </p:sp>

</xml_diff>